<commit_message>
first rought update to module 4 lectures
</commit_message>
<xml_diff>
--- a/LectureFiles/cshl/2016/RNASeq_Module1_Lecture.pptx
+++ b/LectureFiles/cshl/2016/RNASeq_Module1_Lecture.pptx
@@ -168,7 +168,7 @@
   </p:defaultTextStyle>
   <p:extLst>
     <p:ext uri="{EFAFB233-063F-42B5-8137-9DF3F51BA10A}">
-      <p15:sldGuideLst xmlns:p15="http://schemas.microsoft.com/office/powerpoint/2012/main" xmlns="">
+      <p15:sldGuideLst xmlns="" xmlns:p15="http://schemas.microsoft.com/office/powerpoint/2012/main">
         <p15:guide id="1" orient="horz" pos="2160">
           <p15:clr>
             <a:srgbClr val="A4A3A4"/>
@@ -1109,6 +1109,774 @@
       </p:grpSpPr>
       <p:sp>
         <p:nvSpPr>
+          <p:cNvPr id="30721" name="Rectangle 7"/>
+          <p:cNvSpPr>
+            <a:spLocks noGrp="1" noChangeArrowheads="1"/>
+          </p:cNvSpPr>
+          <p:nvPr>
+            <p:ph type="sldNum" sz="quarter" idx="5"/>
+          </p:nvPr>
+        </p:nvSpPr>
+        <p:spPr bwMode="auto">
+          <a:noFill/>
+          <a:extLst>
+            <a:ext uri="{909E8E84-426E-40dd-AFC4-6F175D3DCCD1}">
+              <a14:hiddenFill xmlns:a14="http://schemas.microsoft.com/office/drawing/2010/main">
+                <a:solidFill>
+                  <a:srgbClr val="FFFFFF"/>
+                </a:solidFill>
+              </a14:hiddenFill>
+            </a:ext>
+            <a:ext uri="{91240B29-F687-4f45-9708-019B960494DF}">
+              <a14:hiddenLine xmlns:a14="http://schemas.microsoft.com/office/drawing/2010/main" w="9525">
+                <a:solidFill>
+                  <a:srgbClr val="000000"/>
+                </a:solidFill>
+                <a:miter lim="800000"/>
+                <a:headEnd/>
+                <a:tailEnd/>
+              </a14:hiddenLine>
+            </a:ext>
+          </a:extLst>
+        </p:spPr>
+        <p:txBody>
+          <a:bodyPr/>
+          <a:lstStyle>
+            <a:lvl1pPr eaLnBrk="0" hangingPunct="0">
+              <a:defRPr sz="2400">
+                <a:solidFill>
+                  <a:schemeClr val="tx1"/>
+                </a:solidFill>
+                <a:latin typeface="Arial" charset="0"/>
+                <a:ea typeface="ＭＳ Ｐゴシック" charset="0"/>
+                <a:cs typeface="ＭＳ Ｐゴシック" charset="0"/>
+              </a:defRPr>
+            </a:lvl1pPr>
+            <a:lvl2pPr marL="742950" indent="-285750" eaLnBrk="0" hangingPunct="0">
+              <a:defRPr sz="2400">
+                <a:solidFill>
+                  <a:schemeClr val="tx1"/>
+                </a:solidFill>
+                <a:latin typeface="Arial" charset="0"/>
+                <a:ea typeface="ＭＳ Ｐゴシック" charset="0"/>
+              </a:defRPr>
+            </a:lvl2pPr>
+            <a:lvl3pPr marL="1143000" indent="-228600" eaLnBrk="0" hangingPunct="0">
+              <a:defRPr sz="2400">
+                <a:solidFill>
+                  <a:schemeClr val="tx1"/>
+                </a:solidFill>
+                <a:latin typeface="Arial" charset="0"/>
+                <a:ea typeface="ＭＳ Ｐゴシック" charset="0"/>
+              </a:defRPr>
+            </a:lvl3pPr>
+            <a:lvl4pPr marL="1600200" indent="-228600" eaLnBrk="0" hangingPunct="0">
+              <a:defRPr sz="2400">
+                <a:solidFill>
+                  <a:schemeClr val="tx1"/>
+                </a:solidFill>
+                <a:latin typeface="Arial" charset="0"/>
+                <a:ea typeface="ＭＳ Ｐゴシック" charset="0"/>
+              </a:defRPr>
+            </a:lvl4pPr>
+            <a:lvl5pPr marL="2057400" indent="-228600" eaLnBrk="0" hangingPunct="0">
+              <a:defRPr sz="2400">
+                <a:solidFill>
+                  <a:schemeClr val="tx1"/>
+                </a:solidFill>
+                <a:latin typeface="Arial" charset="0"/>
+                <a:ea typeface="ＭＳ Ｐゴシック" charset="0"/>
+              </a:defRPr>
+            </a:lvl5pPr>
+            <a:lvl6pPr marL="2514600" indent="-228600" eaLnBrk="0" fontAlgn="base" hangingPunct="0">
+              <a:spcBef>
+                <a:spcPct val="0"/>
+              </a:spcBef>
+              <a:spcAft>
+                <a:spcPct val="0"/>
+              </a:spcAft>
+              <a:defRPr sz="2400">
+                <a:solidFill>
+                  <a:schemeClr val="tx1"/>
+                </a:solidFill>
+                <a:latin typeface="Arial" charset="0"/>
+                <a:ea typeface="ＭＳ Ｐゴシック" charset="0"/>
+              </a:defRPr>
+            </a:lvl6pPr>
+            <a:lvl7pPr marL="2971800" indent="-228600" eaLnBrk="0" fontAlgn="base" hangingPunct="0">
+              <a:spcBef>
+                <a:spcPct val="0"/>
+              </a:spcBef>
+              <a:spcAft>
+                <a:spcPct val="0"/>
+              </a:spcAft>
+              <a:defRPr sz="2400">
+                <a:solidFill>
+                  <a:schemeClr val="tx1"/>
+                </a:solidFill>
+                <a:latin typeface="Arial" charset="0"/>
+                <a:ea typeface="ＭＳ Ｐゴシック" charset="0"/>
+              </a:defRPr>
+            </a:lvl7pPr>
+            <a:lvl8pPr marL="3429000" indent="-228600" eaLnBrk="0" fontAlgn="base" hangingPunct="0">
+              <a:spcBef>
+                <a:spcPct val="0"/>
+              </a:spcBef>
+              <a:spcAft>
+                <a:spcPct val="0"/>
+              </a:spcAft>
+              <a:defRPr sz="2400">
+                <a:solidFill>
+                  <a:schemeClr val="tx1"/>
+                </a:solidFill>
+                <a:latin typeface="Arial" charset="0"/>
+                <a:ea typeface="ＭＳ Ｐゴシック" charset="0"/>
+              </a:defRPr>
+            </a:lvl8pPr>
+            <a:lvl9pPr marL="3886200" indent="-228600" eaLnBrk="0" fontAlgn="base" hangingPunct="0">
+              <a:spcBef>
+                <a:spcPct val="0"/>
+              </a:spcBef>
+              <a:spcAft>
+                <a:spcPct val="0"/>
+              </a:spcAft>
+              <a:defRPr sz="2400">
+                <a:solidFill>
+                  <a:schemeClr val="tx1"/>
+                </a:solidFill>
+                <a:latin typeface="Arial" charset="0"/>
+                <a:ea typeface="ＭＳ Ｐゴシック" charset="0"/>
+              </a:defRPr>
+            </a:lvl9pPr>
+          </a:lstStyle>
+          <a:p>
+            <a:pPr eaLnBrk="1" hangingPunct="1"/>
+            <a:fld id="{DFA3F428-FFD0-9B48-B3EB-B3ADDF093787}" type="slidenum">
+              <a:rPr lang="en-US" sz="1300">
+                <a:latin typeface="Calibri" charset="0"/>
+              </a:rPr>
+              <a:pPr eaLnBrk="1" hangingPunct="1"/>
+              <a:t>17</a:t>
+            </a:fld>
+            <a:endParaRPr lang="en-US" sz="1300">
+              <a:latin typeface="Calibri" charset="0"/>
+            </a:endParaRPr>
+          </a:p>
+        </p:txBody>
+      </p:sp>
+      <p:sp>
+        <p:nvSpPr>
+          <p:cNvPr id="30722" name="Rectangle 2"/>
+          <p:cNvSpPr>
+            <a:spLocks noGrp="1" noRot="1" noChangeAspect="1" noChangeArrowheads="1" noTextEdit="1"/>
+          </p:cNvSpPr>
+          <p:nvPr>
+            <p:ph type="sldImg"/>
+          </p:nvPr>
+        </p:nvSpPr>
+        <p:spPr bwMode="auto">
+          <a:solidFill>
+            <a:srgbClr val="FFFFFF"/>
+          </a:solidFill>
+          <a:ln>
+            <a:solidFill>
+              <a:srgbClr val="000000"/>
+            </a:solidFill>
+            <a:miter lim="800000"/>
+            <a:headEnd/>
+            <a:tailEnd/>
+          </a:ln>
+          <a:extLst>
+            <a:ext uri="{FAA26D3D-D897-4be2-8F04-BA451C77F1D7}">
+              <ma14:placeholderFlag xmlns:ma14="http://schemas.microsoft.com/office/mac/drawingml/2011/main" val="1"/>
+            </a:ext>
+          </a:extLst>
+        </p:spPr>
+      </p:sp>
+      <p:sp>
+        <p:nvSpPr>
+          <p:cNvPr id="30723" name="Rectangle 3"/>
+          <p:cNvSpPr>
+            <a:spLocks noGrp="1" noChangeArrowheads="1"/>
+          </p:cNvSpPr>
+          <p:nvPr>
+            <p:ph type="body" idx="1"/>
+          </p:nvPr>
+        </p:nvSpPr>
+        <p:spPr bwMode="auto">
+          <a:solidFill>
+            <a:srgbClr val="FFFFFF"/>
+          </a:solidFill>
+          <a:ln>
+            <a:solidFill>
+              <a:srgbClr val="000000"/>
+            </a:solidFill>
+            <a:miter lim="800000"/>
+            <a:headEnd/>
+            <a:tailEnd/>
+          </a:ln>
+          <a:extLst>
+            <a:ext uri="{FAA26D3D-D897-4be2-8F04-BA451C77F1D7}">
+              <ma14:placeholderFlag xmlns:ma14="http://schemas.microsoft.com/office/mac/drawingml/2011/main" val="1"/>
+            </a:ext>
+          </a:extLst>
+        </p:spPr>
+        <p:txBody>
+          <a:bodyPr wrap="square" numCol="1" anchor="t" anchorCtr="0" compatLnSpc="1">
+            <a:prstTxWarp prst="textNoShape">
+              <a:avLst/>
+            </a:prstTxWarp>
+          </a:bodyPr>
+          <a:lstStyle/>
+          <a:p>
+            <a:pPr eaLnBrk="1" hangingPunct="1"/>
+            <a:endParaRPr lang="en-US">
+              <a:latin typeface="Calibri" charset="0"/>
+              <a:ea typeface="ＭＳ Ｐゴシック" charset="0"/>
+              <a:cs typeface="ＭＳ Ｐゴシック" charset="0"/>
+            </a:endParaRPr>
+          </a:p>
+        </p:txBody>
+      </p:sp>
+    </p:spTree>
+  </p:cSld>
+  <p:clrMapOvr>
+    <a:masterClrMapping/>
+  </p:clrMapOvr>
+</p:notes>
+</file>
+
+<file path=ppt/notesSlides/notesSlide11.xml><?xml version="1.0" encoding="utf-8"?>
+<p:notes xmlns:a="http://schemas.openxmlformats.org/drawingml/2006/main" xmlns:r="http://schemas.openxmlformats.org/officeDocument/2006/relationships" xmlns:p="http://schemas.openxmlformats.org/presentationml/2006/main">
+  <p:cSld>
+    <p:spTree>
+      <p:nvGrpSpPr>
+        <p:cNvPr id="1" name=""/>
+        <p:cNvGrpSpPr/>
+        <p:nvPr/>
+      </p:nvGrpSpPr>
+      <p:grpSpPr>
+        <a:xfrm>
+          <a:off x="0" y="0"/>
+          <a:ext cx="0" cy="0"/>
+          <a:chOff x="0" y="0"/>
+          <a:chExt cx="0" cy="0"/>
+        </a:xfrm>
+      </p:grpSpPr>
+      <p:sp>
+        <p:nvSpPr>
+          <p:cNvPr id="32769" name="Rectangle 7"/>
+          <p:cNvSpPr>
+            <a:spLocks noGrp="1" noChangeArrowheads="1"/>
+          </p:cNvSpPr>
+          <p:nvPr>
+            <p:ph type="sldNum" sz="quarter" idx="5"/>
+          </p:nvPr>
+        </p:nvSpPr>
+        <p:spPr bwMode="auto">
+          <a:noFill/>
+          <a:extLst>
+            <a:ext uri="{909E8E84-426E-40dd-AFC4-6F175D3DCCD1}">
+              <a14:hiddenFill xmlns:a14="http://schemas.microsoft.com/office/drawing/2010/main">
+                <a:solidFill>
+                  <a:srgbClr val="FFFFFF"/>
+                </a:solidFill>
+              </a14:hiddenFill>
+            </a:ext>
+            <a:ext uri="{91240B29-F687-4f45-9708-019B960494DF}">
+              <a14:hiddenLine xmlns:a14="http://schemas.microsoft.com/office/drawing/2010/main" w="9525">
+                <a:solidFill>
+                  <a:srgbClr val="000000"/>
+                </a:solidFill>
+                <a:miter lim="800000"/>
+                <a:headEnd/>
+                <a:tailEnd/>
+              </a14:hiddenLine>
+            </a:ext>
+          </a:extLst>
+        </p:spPr>
+        <p:txBody>
+          <a:bodyPr/>
+          <a:lstStyle>
+            <a:lvl1pPr eaLnBrk="0" hangingPunct="0">
+              <a:defRPr sz="2400">
+                <a:solidFill>
+                  <a:schemeClr val="tx1"/>
+                </a:solidFill>
+                <a:latin typeface="Arial" charset="0"/>
+                <a:ea typeface="ＭＳ Ｐゴシック" charset="0"/>
+                <a:cs typeface="ＭＳ Ｐゴシック" charset="0"/>
+              </a:defRPr>
+            </a:lvl1pPr>
+            <a:lvl2pPr marL="742950" indent="-285750" eaLnBrk="0" hangingPunct="0">
+              <a:defRPr sz="2400">
+                <a:solidFill>
+                  <a:schemeClr val="tx1"/>
+                </a:solidFill>
+                <a:latin typeface="Arial" charset="0"/>
+                <a:ea typeface="ＭＳ Ｐゴシック" charset="0"/>
+              </a:defRPr>
+            </a:lvl2pPr>
+            <a:lvl3pPr marL="1143000" indent="-228600" eaLnBrk="0" hangingPunct="0">
+              <a:defRPr sz="2400">
+                <a:solidFill>
+                  <a:schemeClr val="tx1"/>
+                </a:solidFill>
+                <a:latin typeface="Arial" charset="0"/>
+                <a:ea typeface="ＭＳ Ｐゴシック" charset="0"/>
+              </a:defRPr>
+            </a:lvl3pPr>
+            <a:lvl4pPr marL="1600200" indent="-228600" eaLnBrk="0" hangingPunct="0">
+              <a:defRPr sz="2400">
+                <a:solidFill>
+                  <a:schemeClr val="tx1"/>
+                </a:solidFill>
+                <a:latin typeface="Arial" charset="0"/>
+                <a:ea typeface="ＭＳ Ｐゴシック" charset="0"/>
+              </a:defRPr>
+            </a:lvl4pPr>
+            <a:lvl5pPr marL="2057400" indent="-228600" eaLnBrk="0" hangingPunct="0">
+              <a:defRPr sz="2400">
+                <a:solidFill>
+                  <a:schemeClr val="tx1"/>
+                </a:solidFill>
+                <a:latin typeface="Arial" charset="0"/>
+                <a:ea typeface="ＭＳ Ｐゴシック" charset="0"/>
+              </a:defRPr>
+            </a:lvl5pPr>
+            <a:lvl6pPr marL="2514600" indent="-228600" eaLnBrk="0" fontAlgn="base" hangingPunct="0">
+              <a:spcBef>
+                <a:spcPct val="0"/>
+              </a:spcBef>
+              <a:spcAft>
+                <a:spcPct val="0"/>
+              </a:spcAft>
+              <a:defRPr sz="2400">
+                <a:solidFill>
+                  <a:schemeClr val="tx1"/>
+                </a:solidFill>
+                <a:latin typeface="Arial" charset="0"/>
+                <a:ea typeface="ＭＳ Ｐゴシック" charset="0"/>
+              </a:defRPr>
+            </a:lvl6pPr>
+            <a:lvl7pPr marL="2971800" indent="-228600" eaLnBrk="0" fontAlgn="base" hangingPunct="0">
+              <a:spcBef>
+                <a:spcPct val="0"/>
+              </a:spcBef>
+              <a:spcAft>
+                <a:spcPct val="0"/>
+              </a:spcAft>
+              <a:defRPr sz="2400">
+                <a:solidFill>
+                  <a:schemeClr val="tx1"/>
+                </a:solidFill>
+                <a:latin typeface="Arial" charset="0"/>
+                <a:ea typeface="ＭＳ Ｐゴシック" charset="0"/>
+              </a:defRPr>
+            </a:lvl7pPr>
+            <a:lvl8pPr marL="3429000" indent="-228600" eaLnBrk="0" fontAlgn="base" hangingPunct="0">
+              <a:spcBef>
+                <a:spcPct val="0"/>
+              </a:spcBef>
+              <a:spcAft>
+                <a:spcPct val="0"/>
+              </a:spcAft>
+              <a:defRPr sz="2400">
+                <a:solidFill>
+                  <a:schemeClr val="tx1"/>
+                </a:solidFill>
+                <a:latin typeface="Arial" charset="0"/>
+                <a:ea typeface="ＭＳ Ｐゴシック" charset="0"/>
+              </a:defRPr>
+            </a:lvl8pPr>
+            <a:lvl9pPr marL="3886200" indent="-228600" eaLnBrk="0" fontAlgn="base" hangingPunct="0">
+              <a:spcBef>
+                <a:spcPct val="0"/>
+              </a:spcBef>
+              <a:spcAft>
+                <a:spcPct val="0"/>
+              </a:spcAft>
+              <a:defRPr sz="2400">
+                <a:solidFill>
+                  <a:schemeClr val="tx1"/>
+                </a:solidFill>
+                <a:latin typeface="Arial" charset="0"/>
+                <a:ea typeface="ＭＳ Ｐゴシック" charset="0"/>
+              </a:defRPr>
+            </a:lvl9pPr>
+          </a:lstStyle>
+          <a:p>
+            <a:pPr eaLnBrk="1" hangingPunct="1"/>
+            <a:fld id="{F9EA7C15-AE53-4748-B00A-0F58CCD81A12}" type="slidenum">
+              <a:rPr lang="en-US" sz="1300">
+                <a:latin typeface="Calibri" charset="0"/>
+              </a:rPr>
+              <a:pPr eaLnBrk="1" hangingPunct="1"/>
+              <a:t>18</a:t>
+            </a:fld>
+            <a:endParaRPr lang="en-US" sz="1300">
+              <a:latin typeface="Calibri" charset="0"/>
+            </a:endParaRPr>
+          </a:p>
+        </p:txBody>
+      </p:sp>
+      <p:sp>
+        <p:nvSpPr>
+          <p:cNvPr id="32770" name="Rectangle 2"/>
+          <p:cNvSpPr>
+            <a:spLocks noGrp="1" noRot="1" noChangeAspect="1" noChangeArrowheads="1" noTextEdit="1"/>
+          </p:cNvSpPr>
+          <p:nvPr>
+            <p:ph type="sldImg"/>
+          </p:nvPr>
+        </p:nvSpPr>
+        <p:spPr bwMode="auto">
+          <a:solidFill>
+            <a:srgbClr val="FFFFFF"/>
+          </a:solidFill>
+          <a:ln>
+            <a:solidFill>
+              <a:srgbClr val="000000"/>
+            </a:solidFill>
+            <a:miter lim="800000"/>
+            <a:headEnd/>
+            <a:tailEnd/>
+          </a:ln>
+          <a:extLst>
+            <a:ext uri="{FAA26D3D-D897-4be2-8F04-BA451C77F1D7}">
+              <ma14:placeholderFlag xmlns:ma14="http://schemas.microsoft.com/office/mac/drawingml/2011/main" val="1"/>
+            </a:ext>
+          </a:extLst>
+        </p:spPr>
+      </p:sp>
+      <p:sp>
+        <p:nvSpPr>
+          <p:cNvPr id="32771" name="Rectangle 3"/>
+          <p:cNvSpPr>
+            <a:spLocks noGrp="1" noChangeArrowheads="1"/>
+          </p:cNvSpPr>
+          <p:nvPr>
+            <p:ph type="body" idx="1"/>
+          </p:nvPr>
+        </p:nvSpPr>
+        <p:spPr bwMode="auto">
+          <a:solidFill>
+            <a:srgbClr val="FFFFFF"/>
+          </a:solidFill>
+          <a:ln>
+            <a:solidFill>
+              <a:srgbClr val="000000"/>
+            </a:solidFill>
+            <a:miter lim="800000"/>
+            <a:headEnd/>
+            <a:tailEnd/>
+          </a:ln>
+          <a:extLst>
+            <a:ext uri="{FAA26D3D-D897-4be2-8F04-BA451C77F1D7}">
+              <ma14:placeholderFlag xmlns:ma14="http://schemas.microsoft.com/office/mac/drawingml/2011/main" val="1"/>
+            </a:ext>
+          </a:extLst>
+        </p:spPr>
+        <p:txBody>
+          <a:bodyPr wrap="square" numCol="1" anchor="t" anchorCtr="0" compatLnSpc="1">
+            <a:prstTxWarp prst="textNoShape">
+              <a:avLst/>
+            </a:prstTxWarp>
+          </a:bodyPr>
+          <a:lstStyle/>
+          <a:p>
+            <a:pPr eaLnBrk="1" hangingPunct="1"/>
+            <a:endParaRPr lang="en-US">
+              <a:latin typeface="Calibri" charset="0"/>
+              <a:ea typeface="ＭＳ Ｐゴシック" charset="0"/>
+              <a:cs typeface="ＭＳ Ｐゴシック" charset="0"/>
+            </a:endParaRPr>
+          </a:p>
+        </p:txBody>
+      </p:sp>
+    </p:spTree>
+  </p:cSld>
+  <p:clrMapOvr>
+    <a:masterClrMapping/>
+  </p:clrMapOvr>
+</p:notes>
+</file>
+
+<file path=ppt/notesSlides/notesSlide12.xml><?xml version="1.0" encoding="utf-8"?>
+<p:notes xmlns:a="http://schemas.openxmlformats.org/drawingml/2006/main" xmlns:r="http://schemas.openxmlformats.org/officeDocument/2006/relationships" xmlns:p="http://schemas.openxmlformats.org/presentationml/2006/main">
+  <p:cSld>
+    <p:spTree>
+      <p:nvGrpSpPr>
+        <p:cNvPr id="1" name=""/>
+        <p:cNvGrpSpPr/>
+        <p:nvPr/>
+      </p:nvGrpSpPr>
+      <p:grpSpPr>
+        <a:xfrm>
+          <a:off x="0" y="0"/>
+          <a:ext cx="0" cy="0"/>
+          <a:chOff x="0" y="0"/>
+          <a:chExt cx="0" cy="0"/>
+        </a:xfrm>
+      </p:grpSpPr>
+      <p:sp>
+        <p:nvSpPr>
+          <p:cNvPr id="37889" name="Rectangle 7"/>
+          <p:cNvSpPr>
+            <a:spLocks noGrp="1" noChangeArrowheads="1"/>
+          </p:cNvSpPr>
+          <p:nvPr>
+            <p:ph type="sldNum" sz="quarter" idx="5"/>
+          </p:nvPr>
+        </p:nvSpPr>
+        <p:spPr bwMode="auto">
+          <a:noFill/>
+          <a:extLst>
+            <a:ext uri="{909E8E84-426E-40dd-AFC4-6F175D3DCCD1}">
+              <a14:hiddenFill xmlns:a14="http://schemas.microsoft.com/office/drawing/2010/main">
+                <a:solidFill>
+                  <a:srgbClr val="FFFFFF"/>
+                </a:solidFill>
+              </a14:hiddenFill>
+            </a:ext>
+            <a:ext uri="{91240B29-F687-4f45-9708-019B960494DF}">
+              <a14:hiddenLine xmlns:a14="http://schemas.microsoft.com/office/drawing/2010/main" w="9525">
+                <a:solidFill>
+                  <a:srgbClr val="000000"/>
+                </a:solidFill>
+                <a:miter lim="800000"/>
+                <a:headEnd/>
+                <a:tailEnd/>
+              </a14:hiddenLine>
+            </a:ext>
+          </a:extLst>
+        </p:spPr>
+        <p:txBody>
+          <a:bodyPr/>
+          <a:lstStyle>
+            <a:lvl1pPr eaLnBrk="0" hangingPunct="0">
+              <a:defRPr sz="2400">
+                <a:solidFill>
+                  <a:schemeClr val="tx1"/>
+                </a:solidFill>
+                <a:latin typeface="Arial" charset="0"/>
+                <a:ea typeface="ＭＳ Ｐゴシック" charset="0"/>
+                <a:cs typeface="ＭＳ Ｐゴシック" charset="0"/>
+              </a:defRPr>
+            </a:lvl1pPr>
+            <a:lvl2pPr marL="742950" indent="-285750" eaLnBrk="0" hangingPunct="0">
+              <a:defRPr sz="2400">
+                <a:solidFill>
+                  <a:schemeClr val="tx1"/>
+                </a:solidFill>
+                <a:latin typeface="Arial" charset="0"/>
+                <a:ea typeface="ＭＳ Ｐゴシック" charset="0"/>
+              </a:defRPr>
+            </a:lvl2pPr>
+            <a:lvl3pPr marL="1143000" indent="-228600" eaLnBrk="0" hangingPunct="0">
+              <a:defRPr sz="2400">
+                <a:solidFill>
+                  <a:schemeClr val="tx1"/>
+                </a:solidFill>
+                <a:latin typeface="Arial" charset="0"/>
+                <a:ea typeface="ＭＳ Ｐゴシック" charset="0"/>
+              </a:defRPr>
+            </a:lvl3pPr>
+            <a:lvl4pPr marL="1600200" indent="-228600" eaLnBrk="0" hangingPunct="0">
+              <a:defRPr sz="2400">
+                <a:solidFill>
+                  <a:schemeClr val="tx1"/>
+                </a:solidFill>
+                <a:latin typeface="Arial" charset="0"/>
+                <a:ea typeface="ＭＳ Ｐゴシック" charset="0"/>
+              </a:defRPr>
+            </a:lvl4pPr>
+            <a:lvl5pPr marL="2057400" indent="-228600" eaLnBrk="0" hangingPunct="0">
+              <a:defRPr sz="2400">
+                <a:solidFill>
+                  <a:schemeClr val="tx1"/>
+                </a:solidFill>
+                <a:latin typeface="Arial" charset="0"/>
+                <a:ea typeface="ＭＳ Ｐゴシック" charset="0"/>
+              </a:defRPr>
+            </a:lvl5pPr>
+            <a:lvl6pPr marL="2514600" indent="-228600" eaLnBrk="0" fontAlgn="base" hangingPunct="0">
+              <a:spcBef>
+                <a:spcPct val="0"/>
+              </a:spcBef>
+              <a:spcAft>
+                <a:spcPct val="0"/>
+              </a:spcAft>
+              <a:defRPr sz="2400">
+                <a:solidFill>
+                  <a:schemeClr val="tx1"/>
+                </a:solidFill>
+                <a:latin typeface="Arial" charset="0"/>
+                <a:ea typeface="ＭＳ Ｐゴシック" charset="0"/>
+              </a:defRPr>
+            </a:lvl6pPr>
+            <a:lvl7pPr marL="2971800" indent="-228600" eaLnBrk="0" fontAlgn="base" hangingPunct="0">
+              <a:spcBef>
+                <a:spcPct val="0"/>
+              </a:spcBef>
+              <a:spcAft>
+                <a:spcPct val="0"/>
+              </a:spcAft>
+              <a:defRPr sz="2400">
+                <a:solidFill>
+                  <a:schemeClr val="tx1"/>
+                </a:solidFill>
+                <a:latin typeface="Arial" charset="0"/>
+                <a:ea typeface="ＭＳ Ｐゴシック" charset="0"/>
+              </a:defRPr>
+            </a:lvl7pPr>
+            <a:lvl8pPr marL="3429000" indent="-228600" eaLnBrk="0" fontAlgn="base" hangingPunct="0">
+              <a:spcBef>
+                <a:spcPct val="0"/>
+              </a:spcBef>
+              <a:spcAft>
+                <a:spcPct val="0"/>
+              </a:spcAft>
+              <a:defRPr sz="2400">
+                <a:solidFill>
+                  <a:schemeClr val="tx1"/>
+                </a:solidFill>
+                <a:latin typeface="Arial" charset="0"/>
+                <a:ea typeface="ＭＳ Ｐゴシック" charset="0"/>
+              </a:defRPr>
+            </a:lvl8pPr>
+            <a:lvl9pPr marL="3886200" indent="-228600" eaLnBrk="0" fontAlgn="base" hangingPunct="0">
+              <a:spcBef>
+                <a:spcPct val="0"/>
+              </a:spcBef>
+              <a:spcAft>
+                <a:spcPct val="0"/>
+              </a:spcAft>
+              <a:defRPr sz="2400">
+                <a:solidFill>
+                  <a:schemeClr val="tx1"/>
+                </a:solidFill>
+                <a:latin typeface="Arial" charset="0"/>
+                <a:ea typeface="ＭＳ Ｐゴシック" charset="0"/>
+              </a:defRPr>
+            </a:lvl9pPr>
+          </a:lstStyle>
+          <a:p>
+            <a:pPr eaLnBrk="1" hangingPunct="1"/>
+            <a:fld id="{876BF016-1E7C-3C4A-993E-737B795E1553}" type="slidenum">
+              <a:rPr lang="en-US" sz="1300">
+                <a:latin typeface="Calibri" charset="0"/>
+              </a:rPr>
+              <a:pPr eaLnBrk="1" hangingPunct="1"/>
+              <a:t>20</a:t>
+            </a:fld>
+            <a:endParaRPr lang="en-US" sz="1300">
+              <a:latin typeface="Calibri" charset="0"/>
+            </a:endParaRPr>
+          </a:p>
+        </p:txBody>
+      </p:sp>
+      <p:sp>
+        <p:nvSpPr>
+          <p:cNvPr id="37890" name="Rectangle 2"/>
+          <p:cNvSpPr>
+            <a:spLocks noGrp="1" noRot="1" noChangeAspect="1" noChangeArrowheads="1" noTextEdit="1"/>
+          </p:cNvSpPr>
+          <p:nvPr>
+            <p:ph type="sldImg"/>
+          </p:nvPr>
+        </p:nvSpPr>
+        <p:spPr bwMode="auto">
+          <a:solidFill>
+            <a:srgbClr val="FFFFFF"/>
+          </a:solidFill>
+          <a:ln>
+            <a:solidFill>
+              <a:srgbClr val="000000"/>
+            </a:solidFill>
+            <a:miter lim="800000"/>
+            <a:headEnd/>
+            <a:tailEnd/>
+          </a:ln>
+          <a:extLst>
+            <a:ext uri="{FAA26D3D-D897-4be2-8F04-BA451C77F1D7}">
+              <ma14:placeholderFlag xmlns:ma14="http://schemas.microsoft.com/office/mac/drawingml/2011/main" val="1"/>
+            </a:ext>
+          </a:extLst>
+        </p:spPr>
+      </p:sp>
+      <p:sp>
+        <p:nvSpPr>
+          <p:cNvPr id="37891" name="Rectangle 3"/>
+          <p:cNvSpPr>
+            <a:spLocks noGrp="1" noChangeArrowheads="1"/>
+          </p:cNvSpPr>
+          <p:nvPr>
+            <p:ph type="body" idx="1"/>
+          </p:nvPr>
+        </p:nvSpPr>
+        <p:spPr bwMode="auto">
+          <a:solidFill>
+            <a:srgbClr val="FFFFFF"/>
+          </a:solidFill>
+          <a:ln>
+            <a:solidFill>
+              <a:srgbClr val="000000"/>
+            </a:solidFill>
+            <a:miter lim="800000"/>
+            <a:headEnd/>
+            <a:tailEnd/>
+          </a:ln>
+          <a:extLst>
+            <a:ext uri="{FAA26D3D-D897-4be2-8F04-BA451C77F1D7}">
+              <ma14:placeholderFlag xmlns:ma14="http://schemas.microsoft.com/office/mac/drawingml/2011/main" val="1"/>
+            </a:ext>
+          </a:extLst>
+        </p:spPr>
+        <p:txBody>
+          <a:bodyPr wrap="square" numCol="1" anchor="t" anchorCtr="0" compatLnSpc="1">
+            <a:prstTxWarp prst="textNoShape">
+              <a:avLst/>
+            </a:prstTxWarp>
+          </a:bodyPr>
+          <a:lstStyle/>
+          <a:p>
+            <a:pPr eaLnBrk="1" hangingPunct="1"/>
+            <a:endParaRPr lang="en-US">
+              <a:latin typeface="Calibri" charset="0"/>
+              <a:ea typeface="ＭＳ Ｐゴシック" charset="0"/>
+              <a:cs typeface="ＭＳ Ｐゴシック" charset="0"/>
+            </a:endParaRPr>
+          </a:p>
+        </p:txBody>
+      </p:sp>
+    </p:spTree>
+  </p:cSld>
+  <p:clrMapOvr>
+    <a:masterClrMapping/>
+  </p:clrMapOvr>
+</p:notes>
+</file>
+
+<file path=ppt/notesSlides/notesSlide13.xml><?xml version="1.0" encoding="utf-8"?>
+<p:notes xmlns:a="http://schemas.openxmlformats.org/drawingml/2006/main" xmlns:r="http://schemas.openxmlformats.org/officeDocument/2006/relationships" xmlns:p="http://schemas.openxmlformats.org/presentationml/2006/main">
+  <p:cSld>
+    <p:spTree>
+      <p:nvGrpSpPr>
+        <p:cNvPr id="1" name=""/>
+        <p:cNvGrpSpPr/>
+        <p:nvPr/>
+      </p:nvGrpSpPr>
+      <p:grpSpPr>
+        <a:xfrm>
+          <a:off x="0" y="0"/>
+          <a:ext cx="0" cy="0"/>
+          <a:chOff x="0" y="0"/>
+          <a:chExt cx="0" cy="0"/>
+        </a:xfrm>
+      </p:grpSpPr>
+      <p:sp>
+        <p:nvSpPr>
           <p:cNvPr id="39937" name="Rectangle 7"/>
           <p:cNvSpPr>
             <a:spLocks noGrp="1" noChangeArrowheads="1"/>
@@ -1346,7 +2114,7 @@
 </p:notes>
 </file>
 
-<file path=ppt/notesSlides/notesSlide11.xml><?xml version="1.0" encoding="utf-8"?>
+<file path=ppt/notesSlides/notesSlide14.xml><?xml version="1.0" encoding="utf-8"?>
 <p:notes xmlns:a="http://schemas.openxmlformats.org/drawingml/2006/main" xmlns:r="http://schemas.openxmlformats.org/officeDocument/2006/relationships" xmlns:p="http://schemas.openxmlformats.org/presentationml/2006/main">
   <p:cSld>
     <p:spTree>
@@ -2098,7 +2866,114 @@
           <a:lstStyle/>
           <a:p>
             <a:pPr eaLnBrk="1" hangingPunct="1"/>
-            <a:endParaRPr lang="en-US">
+            <a:r>
+              <a:rPr lang="en-US" dirty="0" smtClean="0">
+                <a:latin typeface="Calibri" charset="0"/>
+                <a:ea typeface="ＭＳ Ｐゴシック" charset="0"/>
+                <a:cs typeface="ＭＳ Ｐゴシック" charset="0"/>
+              </a:rPr>
+              <a:t>Notes on paired</a:t>
+            </a:r>
+            <a:r>
+              <a:rPr lang="en-US" baseline="0" dirty="0" smtClean="0">
+                <a:latin typeface="Calibri" charset="0"/>
+                <a:ea typeface="ＭＳ Ｐゴシック" charset="0"/>
+                <a:cs typeface="ＭＳ Ｐゴシック" charset="0"/>
+              </a:rPr>
+              <a:t> end read depiction:</a:t>
+            </a:r>
+            <a:endParaRPr lang="en-US" dirty="0" smtClean="0">
+              <a:latin typeface="Calibri" charset="0"/>
+              <a:ea typeface="ＭＳ Ｐゴシック" charset="0"/>
+              <a:cs typeface="ＭＳ Ｐゴシック" charset="0"/>
+            </a:endParaRPr>
+          </a:p>
+          <a:p>
+            <a:pPr marL="171450" indent="-171450" eaLnBrk="1" hangingPunct="1">
+              <a:buFontTx/>
+              <a:buChar char="-"/>
+            </a:pPr>
+            <a:r>
+              <a:rPr lang="en-US" baseline="0" dirty="0" smtClean="0">
+                <a:latin typeface="Calibri" charset="0"/>
+                <a:ea typeface="ＭＳ Ｐゴシック" charset="0"/>
+                <a:cs typeface="ＭＳ Ｐゴシック" charset="0"/>
+              </a:rPr>
+              <a:t>Each line depicts a sequenced fragment. These consist of adapters, and portions sequenced from each end</a:t>
+            </a:r>
+          </a:p>
+          <a:p>
+            <a:pPr marL="171450" indent="-171450" eaLnBrk="1" hangingPunct="1">
+              <a:buFontTx/>
+              <a:buChar char="-"/>
+            </a:pPr>
+            <a:r>
+              <a:rPr lang="en-US" baseline="0" dirty="0" smtClean="0">
+                <a:latin typeface="Calibri" charset="0"/>
+                <a:ea typeface="ＭＳ Ｐゴシック" charset="0"/>
+                <a:cs typeface="ＭＳ Ｐゴシック" charset="0"/>
+              </a:rPr>
+              <a:t>Blue is being used to indicated read 1, and red for read 2</a:t>
+            </a:r>
+          </a:p>
+          <a:p>
+            <a:pPr marL="171450" indent="-171450" eaLnBrk="1" hangingPunct="1">
+              <a:buFontTx/>
+              <a:buChar char="-"/>
+            </a:pPr>
+            <a:r>
+              <a:rPr lang="en-US" baseline="0" dirty="0" smtClean="0">
+                <a:latin typeface="Calibri" charset="0"/>
+                <a:ea typeface="ＭＳ Ｐゴシック" charset="0"/>
+                <a:cs typeface="ＭＳ Ｐゴシック" charset="0"/>
+              </a:rPr>
+              <a:t>If the fragment is long enough relative to the read sequence length, there will be a portion in the middle that is not sequenced</a:t>
+            </a:r>
+          </a:p>
+          <a:p>
+            <a:pPr marL="171450" indent="-171450" eaLnBrk="1" hangingPunct="1">
+              <a:buFontTx/>
+              <a:buChar char="-"/>
+            </a:pPr>
+            <a:r>
+              <a:rPr lang="en-US" baseline="0" dirty="0" smtClean="0">
+                <a:latin typeface="Calibri" charset="0"/>
+                <a:ea typeface="ＭＳ Ｐゴシック" charset="0"/>
+                <a:cs typeface="ＭＳ Ｐゴシック" charset="0"/>
+              </a:rPr>
+              <a:t>Read1 and Read2 can also overlap</a:t>
+            </a:r>
+          </a:p>
+          <a:p>
+            <a:pPr marL="171450" indent="-171450" eaLnBrk="1" hangingPunct="1">
+              <a:buFontTx/>
+              <a:buChar char="-"/>
+            </a:pPr>
+            <a:endParaRPr lang="en-US" dirty="0" smtClean="0">
+              <a:latin typeface="Calibri" charset="0"/>
+              <a:ea typeface="ＭＳ Ｐゴシック" charset="0"/>
+              <a:cs typeface="ＭＳ Ｐゴシック" charset="0"/>
+            </a:endParaRPr>
+          </a:p>
+          <a:p>
+            <a:pPr eaLnBrk="1" hangingPunct="1"/>
+            <a:r>
+              <a:rPr lang="en-US" dirty="0" smtClean="0">
+                <a:latin typeface="Calibri" charset="0"/>
+                <a:ea typeface="ＭＳ Ｐゴシック" charset="0"/>
+                <a:cs typeface="ＭＳ Ｐゴシック" charset="0"/>
+              </a:rPr>
+              <a:t>Note the portio</a:t>
+            </a:r>
+            <a:r>
+              <a:rPr lang="en-US" baseline="0" dirty="0" smtClean="0">
+                <a:latin typeface="Calibri" charset="0"/>
+                <a:ea typeface="ＭＳ Ｐゴシック" charset="0"/>
+                <a:cs typeface="ＭＳ Ｐゴシック" charset="0"/>
+              </a:rPr>
+              <a:t>n </a:t>
+            </a:r>
+            <a:endParaRPr lang="en-US" dirty="0">
               <a:latin typeface="Calibri" charset="0"/>
               <a:ea typeface="ＭＳ Ｐゴシック" charset="0"/>
               <a:cs typeface="ＭＳ Ｐゴシック" charset="0"/>
@@ -2901,236 +3776,163 @@
       </p:grpSpPr>
       <p:sp>
         <p:nvSpPr>
-          <p:cNvPr id="30721" name="Rectangle 7"/>
+          <p:cNvPr id="2" name="Slide Image Placeholder 1"/>
           <p:cNvSpPr>
-            <a:spLocks noGrp="1" noChangeArrowheads="1"/>
-          </p:cNvSpPr>
-          <p:nvPr>
-            <p:ph type="sldNum" sz="quarter" idx="5"/>
-          </p:nvPr>
-        </p:nvSpPr>
-        <p:spPr bwMode="auto">
-          <a:noFill/>
-          <a:extLst>
-            <a:ext uri="{909E8E84-426E-40dd-AFC4-6F175D3DCCD1}">
-              <a14:hiddenFill xmlns:a14="http://schemas.microsoft.com/office/drawing/2010/main">
-                <a:solidFill>
-                  <a:srgbClr val="FFFFFF"/>
-                </a:solidFill>
-              </a14:hiddenFill>
-            </a:ext>
-            <a:ext uri="{91240B29-F687-4f45-9708-019B960494DF}">
-              <a14:hiddenLine xmlns:a14="http://schemas.microsoft.com/office/drawing/2010/main" w="9525">
-                <a:solidFill>
-                  <a:srgbClr val="000000"/>
-                </a:solidFill>
-                <a:miter lim="800000"/>
-                <a:headEnd/>
-                <a:tailEnd/>
-              </a14:hiddenLine>
-            </a:ext>
-          </a:extLst>
-        </p:spPr>
-        <p:txBody>
-          <a:bodyPr/>
-          <a:lstStyle>
-            <a:lvl1pPr eaLnBrk="0" hangingPunct="0">
-              <a:defRPr sz="2400">
-                <a:solidFill>
-                  <a:schemeClr val="tx1"/>
-                </a:solidFill>
-                <a:latin typeface="Arial" charset="0"/>
-                <a:ea typeface="ＭＳ Ｐゴシック" charset="0"/>
-                <a:cs typeface="ＭＳ Ｐゴシック" charset="0"/>
-              </a:defRPr>
-            </a:lvl1pPr>
-            <a:lvl2pPr marL="742950" indent="-285750" eaLnBrk="0" hangingPunct="0">
-              <a:defRPr sz="2400">
-                <a:solidFill>
-                  <a:schemeClr val="tx1"/>
-                </a:solidFill>
-                <a:latin typeface="Arial" charset="0"/>
-                <a:ea typeface="ＭＳ Ｐゴシック" charset="0"/>
-              </a:defRPr>
-            </a:lvl2pPr>
-            <a:lvl3pPr marL="1143000" indent="-228600" eaLnBrk="0" hangingPunct="0">
-              <a:defRPr sz="2400">
-                <a:solidFill>
-                  <a:schemeClr val="tx1"/>
-                </a:solidFill>
-                <a:latin typeface="Arial" charset="0"/>
-                <a:ea typeface="ＭＳ Ｐゴシック" charset="0"/>
-              </a:defRPr>
-            </a:lvl3pPr>
-            <a:lvl4pPr marL="1600200" indent="-228600" eaLnBrk="0" hangingPunct="0">
-              <a:defRPr sz="2400">
-                <a:solidFill>
-                  <a:schemeClr val="tx1"/>
-                </a:solidFill>
-                <a:latin typeface="Arial" charset="0"/>
-                <a:ea typeface="ＭＳ Ｐゴシック" charset="0"/>
-              </a:defRPr>
-            </a:lvl4pPr>
-            <a:lvl5pPr marL="2057400" indent="-228600" eaLnBrk="0" hangingPunct="0">
-              <a:defRPr sz="2400">
-                <a:solidFill>
-                  <a:schemeClr val="tx1"/>
-                </a:solidFill>
-                <a:latin typeface="Arial" charset="0"/>
-                <a:ea typeface="ＭＳ Ｐゴシック" charset="0"/>
-              </a:defRPr>
-            </a:lvl5pPr>
-            <a:lvl6pPr marL="2514600" indent="-228600" eaLnBrk="0" fontAlgn="base" hangingPunct="0">
-              <a:spcBef>
-                <a:spcPct val="0"/>
-              </a:spcBef>
-              <a:spcAft>
-                <a:spcPct val="0"/>
-              </a:spcAft>
-              <a:defRPr sz="2400">
-                <a:solidFill>
-                  <a:schemeClr val="tx1"/>
-                </a:solidFill>
-                <a:latin typeface="Arial" charset="0"/>
-                <a:ea typeface="ＭＳ Ｐゴシック" charset="0"/>
-              </a:defRPr>
-            </a:lvl6pPr>
-            <a:lvl7pPr marL="2971800" indent="-228600" eaLnBrk="0" fontAlgn="base" hangingPunct="0">
-              <a:spcBef>
-                <a:spcPct val="0"/>
-              </a:spcBef>
-              <a:spcAft>
-                <a:spcPct val="0"/>
-              </a:spcAft>
-              <a:defRPr sz="2400">
-                <a:solidFill>
-                  <a:schemeClr val="tx1"/>
-                </a:solidFill>
-                <a:latin typeface="Arial" charset="0"/>
-                <a:ea typeface="ＭＳ Ｐゴシック" charset="0"/>
-              </a:defRPr>
-            </a:lvl7pPr>
-            <a:lvl8pPr marL="3429000" indent="-228600" eaLnBrk="0" fontAlgn="base" hangingPunct="0">
-              <a:spcBef>
-                <a:spcPct val="0"/>
-              </a:spcBef>
-              <a:spcAft>
-                <a:spcPct val="0"/>
-              </a:spcAft>
-              <a:defRPr sz="2400">
-                <a:solidFill>
-                  <a:schemeClr val="tx1"/>
-                </a:solidFill>
-                <a:latin typeface="Arial" charset="0"/>
-                <a:ea typeface="ＭＳ Ｐゴシック" charset="0"/>
-              </a:defRPr>
-            </a:lvl8pPr>
-            <a:lvl9pPr marL="3886200" indent="-228600" eaLnBrk="0" fontAlgn="base" hangingPunct="0">
-              <a:spcBef>
-                <a:spcPct val="0"/>
-              </a:spcBef>
-              <a:spcAft>
-                <a:spcPct val="0"/>
-              </a:spcAft>
-              <a:defRPr sz="2400">
-                <a:solidFill>
-                  <a:schemeClr val="tx1"/>
-                </a:solidFill>
-                <a:latin typeface="Arial" charset="0"/>
-                <a:ea typeface="ＭＳ Ｐゴシック" charset="0"/>
-              </a:defRPr>
-            </a:lvl9pPr>
-          </a:lstStyle>
-          <a:p>
-            <a:pPr eaLnBrk="1" hangingPunct="1"/>
-            <a:fld id="{DFA3F428-FFD0-9B48-B3EB-B3ADDF093787}" type="slidenum">
-              <a:rPr lang="en-US" sz="1300">
-                <a:latin typeface="Calibri" charset="0"/>
-              </a:rPr>
-              <a:pPr eaLnBrk="1" hangingPunct="1"/>
-              <a:t>17</a:t>
-            </a:fld>
-            <a:endParaRPr lang="en-US" sz="1300">
-              <a:latin typeface="Calibri" charset="0"/>
-            </a:endParaRPr>
-          </a:p>
-        </p:txBody>
-      </p:sp>
-      <p:sp>
-        <p:nvSpPr>
-          <p:cNvPr id="30722" name="Rectangle 2"/>
-          <p:cNvSpPr>
-            <a:spLocks noGrp="1" noRot="1" noChangeAspect="1" noChangeArrowheads="1" noTextEdit="1"/>
+            <a:spLocks noGrp="1" noRot="1" noChangeAspect="1"/>
           </p:cNvSpPr>
           <p:nvPr>
             <p:ph type="sldImg"/>
           </p:nvPr>
         </p:nvSpPr>
-        <p:spPr bwMode="auto">
-          <a:solidFill>
-            <a:srgbClr val="FFFFFF"/>
-          </a:solidFill>
-          <a:ln>
-            <a:solidFill>
-              <a:srgbClr val="000000"/>
-            </a:solidFill>
-            <a:miter lim="800000"/>
-            <a:headEnd/>
-            <a:tailEnd/>
-          </a:ln>
-          <a:extLst>
-            <a:ext uri="{FAA26D3D-D897-4be2-8F04-BA451C77F1D7}">
-              <ma14:placeholderFlag xmlns:ma14="http://schemas.microsoft.com/office/mac/drawingml/2011/main" val="1"/>
-            </a:ext>
-          </a:extLst>
-        </p:spPr>
+        <p:spPr/>
       </p:sp>
       <p:sp>
         <p:nvSpPr>
-          <p:cNvPr id="30723" name="Rectangle 3"/>
+          <p:cNvPr id="3" name="Notes Placeholder 2"/>
           <p:cNvSpPr>
-            <a:spLocks noGrp="1" noChangeArrowheads="1"/>
+            <a:spLocks noGrp="1"/>
           </p:cNvSpPr>
           <p:nvPr>
             <p:ph type="body" idx="1"/>
           </p:nvPr>
         </p:nvSpPr>
-        <p:spPr bwMode="auto">
-          <a:solidFill>
-            <a:srgbClr val="FFFFFF"/>
-          </a:solidFill>
-          <a:ln>
-            <a:solidFill>
-              <a:srgbClr val="000000"/>
-            </a:solidFill>
-            <a:miter lim="800000"/>
-            <a:headEnd/>
-            <a:tailEnd/>
-          </a:ln>
-          <a:extLst>
-            <a:ext uri="{FAA26D3D-D897-4be2-8F04-BA451C77F1D7}">
-              <ma14:placeholderFlag xmlns:ma14="http://schemas.microsoft.com/office/mac/drawingml/2011/main" val="1"/>
-            </a:ext>
-          </a:extLst>
-        </p:spPr>
+        <p:spPr/>
         <p:txBody>
-          <a:bodyPr wrap="square" numCol="1" anchor="t" anchorCtr="0" compatLnSpc="1">
-            <a:prstTxWarp prst="textNoShape">
-              <a:avLst/>
-            </a:prstTxWarp>
-          </a:bodyPr>
+          <a:bodyPr/>
           <a:lstStyle/>
           <a:p>
-            <a:pPr eaLnBrk="1" hangingPunct="1"/>
-            <a:endParaRPr lang="en-US">
-              <a:latin typeface="Calibri" charset="0"/>
-              <a:ea typeface="ＭＳ Ｐゴシック" charset="0"/>
-              <a:cs typeface="ＭＳ Ｐゴシック" charset="0"/>
-            </a:endParaRPr>
+            <a:pPr marL="0" marR="0" indent="0" algn="l" defTabSz="914400" rtl="0" eaLnBrk="0" fontAlgn="base" latinLnBrk="0" hangingPunct="0">
+              <a:lnSpc>
+                <a:spcPct val="100000"/>
+              </a:lnSpc>
+              <a:spcBef>
+                <a:spcPct val="30000"/>
+              </a:spcBef>
+              <a:spcAft>
+                <a:spcPct val="0"/>
+              </a:spcAft>
+              <a:buClrTx/>
+              <a:buSzTx/>
+              <a:buFontTx/>
+              <a:buNone/>
+              <a:tabLst/>
+              <a:defRPr/>
+            </a:pPr>
+            <a:r>
+              <a:rPr lang="en-US" dirty="0" smtClean="0"/>
+              <a:t>-</a:t>
+            </a:r>
+            <a:r>
+              <a:rPr lang="en-US" baseline="0" dirty="0" smtClean="0"/>
+              <a:t> </a:t>
+            </a:r>
+            <a:r>
+              <a:rPr lang="en-US" dirty="0" smtClean="0"/>
+              <a:t>RNA-seq library construction may</a:t>
+            </a:r>
+            <a:r>
+              <a:rPr lang="en-US" baseline="0" dirty="0" smtClean="0"/>
+              <a:t> </a:t>
+            </a:r>
+            <a:r>
+              <a:rPr lang="en-US" dirty="0" smtClean="0"/>
+              <a:t>involve both fragmentation and size selection. These procedures may be modified according to the integrity and amount of starting total RNA. The</a:t>
+            </a:r>
+            <a:r>
+              <a:rPr lang="en-US" baseline="0" dirty="0" smtClean="0"/>
+              <a:t> </a:t>
+            </a:r>
+            <a:r>
+              <a:rPr lang="en-US" dirty="0" smtClean="0"/>
+              <a:t>distributions of RNA molecule sizes are depicted for input total RNA and at various stages during the process of RNA/cDNA fragmentation and size selection.</a:t>
+            </a:r>
+            <a:r>
+              <a:rPr lang="en-US" baseline="0" dirty="0" smtClean="0"/>
+              <a:t> </a:t>
+            </a:r>
+            <a:r>
+              <a:rPr lang="en-US" dirty="0" smtClean="0"/>
+              <a:t>Commonly used methods for fragmentation and size selection are</a:t>
+            </a:r>
+            <a:r>
+              <a:rPr lang="en-US" baseline="0" dirty="0" smtClean="0"/>
+              <a:t> </a:t>
+            </a:r>
+            <a:r>
+              <a:rPr lang="en-US" dirty="0" smtClean="0"/>
+              <a:t>depicted along with the expected output of a quality-control assay at each stage (in the</a:t>
+            </a:r>
+            <a:r>
+              <a:rPr lang="en-US" baseline="0" dirty="0" smtClean="0"/>
+              <a:t> </a:t>
+            </a:r>
+            <a:r>
+              <a:rPr lang="en-US" dirty="0" smtClean="0"/>
+              <a:t>form of a capillary electrophoresis trace). Note that in the final library, it is typical that the majority of RNAs below a certain</a:t>
+            </a:r>
+            <a:r>
+              <a:rPr lang="en-US" baseline="0" dirty="0" smtClean="0"/>
+              <a:t> </a:t>
+            </a:r>
+            <a:r>
+              <a:rPr lang="en-US" dirty="0" smtClean="0"/>
+              <a:t>size (typically &lt;150–200 </a:t>
+            </a:r>
+            <a:r>
+              <a:rPr lang="en-US" dirty="0" err="1" smtClean="0"/>
+              <a:t>bp</a:t>
+            </a:r>
+            <a:r>
+              <a:rPr lang="en-US" dirty="0" smtClean="0"/>
+              <a:t>) are</a:t>
+            </a:r>
+            <a:r>
+              <a:rPr lang="en-US" baseline="0" dirty="0" smtClean="0"/>
+              <a:t> </a:t>
+            </a:r>
+            <a:r>
+              <a:rPr lang="en-US" dirty="0" smtClean="0"/>
+              <a:t>underrepresented. Refer to S3 Table and S7 Table for more details on many of the concepts depicted in this figure.</a:t>
+            </a:r>
+            <a:endParaRPr lang="en-US" dirty="0"/>
+          </a:p>
+        </p:txBody>
+      </p:sp>
+      <p:sp>
+        <p:nvSpPr>
+          <p:cNvPr id="4" name="Slide Number Placeholder 3"/>
+          <p:cNvSpPr>
+            <a:spLocks noGrp="1"/>
+          </p:cNvSpPr>
+          <p:nvPr>
+            <p:ph type="sldNum" sz="quarter" idx="10"/>
+          </p:nvPr>
+        </p:nvSpPr>
+        <p:spPr/>
+        <p:txBody>
+          <a:bodyPr/>
+          <a:lstStyle/>
+          <a:p>
+            <a:pPr>
+              <a:defRPr/>
+            </a:pPr>
+            <a:fld id="{58FBEE90-0CDA-3447-B595-4F8759630F3A}" type="slidenum">
+              <a:rPr lang="en-US" smtClean="0"/>
+              <a:pPr>
+                <a:defRPr/>
+              </a:pPr>
+              <a:t>13</a:t>
+            </a:fld>
+            <a:endParaRPr lang="en-US"/>
           </a:p>
         </p:txBody>
       </p:sp>
     </p:spTree>
+    <p:extLst>
+      <p:ext uri="{BB962C8B-B14F-4D97-AF65-F5344CB8AC3E}">
+        <p14:creationId xmlns:p14="http://schemas.microsoft.com/office/powerpoint/2010/main" val="185660931"/>
+      </p:ext>
+    </p:extLst>
   </p:cSld>
   <p:clrMapOvr>
     <a:masterClrMapping/>
@@ -3157,236 +3959,347 @@
       </p:grpSpPr>
       <p:sp>
         <p:nvSpPr>
-          <p:cNvPr id="32769" name="Rectangle 7"/>
+          <p:cNvPr id="2" name="Slide Image Placeholder 1"/>
           <p:cNvSpPr>
-            <a:spLocks noGrp="1" noChangeArrowheads="1"/>
-          </p:cNvSpPr>
-          <p:nvPr>
-            <p:ph type="sldNum" sz="quarter" idx="5"/>
-          </p:nvPr>
-        </p:nvSpPr>
-        <p:spPr bwMode="auto">
-          <a:noFill/>
-          <a:extLst>
-            <a:ext uri="{909E8E84-426E-40dd-AFC4-6F175D3DCCD1}">
-              <a14:hiddenFill xmlns:a14="http://schemas.microsoft.com/office/drawing/2010/main">
-                <a:solidFill>
-                  <a:srgbClr val="FFFFFF"/>
-                </a:solidFill>
-              </a14:hiddenFill>
-            </a:ext>
-            <a:ext uri="{91240B29-F687-4f45-9708-019B960494DF}">
-              <a14:hiddenLine xmlns:a14="http://schemas.microsoft.com/office/drawing/2010/main" w="9525">
-                <a:solidFill>
-                  <a:srgbClr val="000000"/>
-                </a:solidFill>
-                <a:miter lim="800000"/>
-                <a:headEnd/>
-                <a:tailEnd/>
-              </a14:hiddenLine>
-            </a:ext>
-          </a:extLst>
-        </p:spPr>
-        <p:txBody>
-          <a:bodyPr/>
-          <a:lstStyle>
-            <a:lvl1pPr eaLnBrk="0" hangingPunct="0">
-              <a:defRPr sz="2400">
-                <a:solidFill>
-                  <a:schemeClr val="tx1"/>
-                </a:solidFill>
-                <a:latin typeface="Arial" charset="0"/>
-                <a:ea typeface="ＭＳ Ｐゴシック" charset="0"/>
-                <a:cs typeface="ＭＳ Ｐゴシック" charset="0"/>
-              </a:defRPr>
-            </a:lvl1pPr>
-            <a:lvl2pPr marL="742950" indent="-285750" eaLnBrk="0" hangingPunct="0">
-              <a:defRPr sz="2400">
-                <a:solidFill>
-                  <a:schemeClr val="tx1"/>
-                </a:solidFill>
-                <a:latin typeface="Arial" charset="0"/>
-                <a:ea typeface="ＭＳ Ｐゴシック" charset="0"/>
-              </a:defRPr>
-            </a:lvl2pPr>
-            <a:lvl3pPr marL="1143000" indent="-228600" eaLnBrk="0" hangingPunct="0">
-              <a:defRPr sz="2400">
-                <a:solidFill>
-                  <a:schemeClr val="tx1"/>
-                </a:solidFill>
-                <a:latin typeface="Arial" charset="0"/>
-                <a:ea typeface="ＭＳ Ｐゴシック" charset="0"/>
-              </a:defRPr>
-            </a:lvl3pPr>
-            <a:lvl4pPr marL="1600200" indent="-228600" eaLnBrk="0" hangingPunct="0">
-              <a:defRPr sz="2400">
-                <a:solidFill>
-                  <a:schemeClr val="tx1"/>
-                </a:solidFill>
-                <a:latin typeface="Arial" charset="0"/>
-                <a:ea typeface="ＭＳ Ｐゴシック" charset="0"/>
-              </a:defRPr>
-            </a:lvl4pPr>
-            <a:lvl5pPr marL="2057400" indent="-228600" eaLnBrk="0" hangingPunct="0">
-              <a:defRPr sz="2400">
-                <a:solidFill>
-                  <a:schemeClr val="tx1"/>
-                </a:solidFill>
-                <a:latin typeface="Arial" charset="0"/>
-                <a:ea typeface="ＭＳ Ｐゴシック" charset="0"/>
-              </a:defRPr>
-            </a:lvl5pPr>
-            <a:lvl6pPr marL="2514600" indent="-228600" eaLnBrk="0" fontAlgn="base" hangingPunct="0">
-              <a:spcBef>
-                <a:spcPct val="0"/>
-              </a:spcBef>
-              <a:spcAft>
-                <a:spcPct val="0"/>
-              </a:spcAft>
-              <a:defRPr sz="2400">
-                <a:solidFill>
-                  <a:schemeClr val="tx1"/>
-                </a:solidFill>
-                <a:latin typeface="Arial" charset="0"/>
-                <a:ea typeface="ＭＳ Ｐゴシック" charset="0"/>
-              </a:defRPr>
-            </a:lvl6pPr>
-            <a:lvl7pPr marL="2971800" indent="-228600" eaLnBrk="0" fontAlgn="base" hangingPunct="0">
-              <a:spcBef>
-                <a:spcPct val="0"/>
-              </a:spcBef>
-              <a:spcAft>
-                <a:spcPct val="0"/>
-              </a:spcAft>
-              <a:defRPr sz="2400">
-                <a:solidFill>
-                  <a:schemeClr val="tx1"/>
-                </a:solidFill>
-                <a:latin typeface="Arial" charset="0"/>
-                <a:ea typeface="ＭＳ Ｐゴシック" charset="0"/>
-              </a:defRPr>
-            </a:lvl7pPr>
-            <a:lvl8pPr marL="3429000" indent="-228600" eaLnBrk="0" fontAlgn="base" hangingPunct="0">
-              <a:spcBef>
-                <a:spcPct val="0"/>
-              </a:spcBef>
-              <a:spcAft>
-                <a:spcPct val="0"/>
-              </a:spcAft>
-              <a:defRPr sz="2400">
-                <a:solidFill>
-                  <a:schemeClr val="tx1"/>
-                </a:solidFill>
-                <a:latin typeface="Arial" charset="0"/>
-                <a:ea typeface="ＭＳ Ｐゴシック" charset="0"/>
-              </a:defRPr>
-            </a:lvl8pPr>
-            <a:lvl9pPr marL="3886200" indent="-228600" eaLnBrk="0" fontAlgn="base" hangingPunct="0">
-              <a:spcBef>
-                <a:spcPct val="0"/>
-              </a:spcBef>
-              <a:spcAft>
-                <a:spcPct val="0"/>
-              </a:spcAft>
-              <a:defRPr sz="2400">
-                <a:solidFill>
-                  <a:schemeClr val="tx1"/>
-                </a:solidFill>
-                <a:latin typeface="Arial" charset="0"/>
-                <a:ea typeface="ＭＳ Ｐゴシック" charset="0"/>
-              </a:defRPr>
-            </a:lvl9pPr>
-          </a:lstStyle>
-          <a:p>
-            <a:pPr eaLnBrk="1" hangingPunct="1"/>
-            <a:fld id="{F9EA7C15-AE53-4748-B00A-0F58CCD81A12}" type="slidenum">
-              <a:rPr lang="en-US" sz="1300">
-                <a:latin typeface="Calibri" charset="0"/>
-              </a:rPr>
-              <a:pPr eaLnBrk="1" hangingPunct="1"/>
-              <a:t>18</a:t>
-            </a:fld>
-            <a:endParaRPr lang="en-US" sz="1300">
-              <a:latin typeface="Calibri" charset="0"/>
-            </a:endParaRPr>
-          </a:p>
-        </p:txBody>
-      </p:sp>
-      <p:sp>
-        <p:nvSpPr>
-          <p:cNvPr id="32770" name="Rectangle 2"/>
-          <p:cNvSpPr>
-            <a:spLocks noGrp="1" noRot="1" noChangeAspect="1" noChangeArrowheads="1" noTextEdit="1"/>
+            <a:spLocks noGrp="1" noRot="1" noChangeAspect="1"/>
           </p:cNvSpPr>
           <p:nvPr>
             <p:ph type="sldImg"/>
           </p:nvPr>
         </p:nvSpPr>
-        <p:spPr bwMode="auto">
-          <a:solidFill>
-            <a:srgbClr val="FFFFFF"/>
-          </a:solidFill>
-          <a:ln>
-            <a:solidFill>
-              <a:srgbClr val="000000"/>
-            </a:solidFill>
-            <a:miter lim="800000"/>
-            <a:headEnd/>
-            <a:tailEnd/>
-          </a:ln>
-          <a:extLst>
-            <a:ext uri="{FAA26D3D-D897-4be2-8F04-BA451C77F1D7}">
-              <ma14:placeholderFlag xmlns:ma14="http://schemas.microsoft.com/office/mac/drawingml/2011/main" val="1"/>
-            </a:ext>
-          </a:extLst>
-        </p:spPr>
+        <p:spPr/>
       </p:sp>
       <p:sp>
         <p:nvSpPr>
-          <p:cNvPr id="32771" name="Rectangle 3"/>
+          <p:cNvPr id="3" name="Notes Placeholder 2"/>
           <p:cNvSpPr>
-            <a:spLocks noGrp="1" noChangeArrowheads="1"/>
+            <a:spLocks noGrp="1"/>
           </p:cNvSpPr>
           <p:nvPr>
             <p:ph type="body" idx="1"/>
           </p:nvPr>
         </p:nvSpPr>
-        <p:spPr bwMode="auto">
-          <a:solidFill>
-            <a:srgbClr val="FFFFFF"/>
-          </a:solidFill>
-          <a:ln>
-            <a:solidFill>
-              <a:srgbClr val="000000"/>
-            </a:solidFill>
-            <a:miter lim="800000"/>
-            <a:headEnd/>
-            <a:tailEnd/>
-          </a:ln>
-          <a:extLst>
-            <a:ext uri="{FAA26D3D-D897-4be2-8F04-BA451C77F1D7}">
-              <ma14:placeholderFlag xmlns:ma14="http://schemas.microsoft.com/office/mac/drawingml/2011/main" val="1"/>
-            </a:ext>
-          </a:extLst>
-        </p:spPr>
+        <p:spPr/>
         <p:txBody>
-          <a:bodyPr wrap="square" numCol="1" anchor="t" anchorCtr="0" compatLnSpc="1">
-            <a:prstTxWarp prst="textNoShape">
-              <a:avLst/>
-            </a:prstTxWarp>
+          <a:bodyPr>
+            <a:normAutofit fontScale="55000" lnSpcReduction="20000"/>
           </a:bodyPr>
           <a:lstStyle/>
           <a:p>
-            <a:pPr eaLnBrk="1" hangingPunct="1"/>
-            <a:endParaRPr lang="en-US">
-              <a:latin typeface="Calibri" charset="0"/>
-              <a:ea typeface="ＭＳ Ｐゴシック" charset="0"/>
-              <a:cs typeface="ＭＳ Ｐゴシック" charset="0"/>
-            </a:endParaRPr>
+            <a:r>
+              <a:rPr lang="en-US" dirty="0" smtClean="0"/>
+              <a:t>RNA-seq library enrichment strategies that influence interpretation and analysis. RNA-seq library construction protocols differ widely, and these</a:t>
+            </a:r>
+            <a:r>
+              <a:rPr lang="en-US" baseline="0" dirty="0" smtClean="0"/>
+              <a:t> </a:t>
+            </a:r>
+            <a:r>
+              <a:rPr lang="en-US" dirty="0" smtClean="0"/>
+              <a:t>differences have significant consequences for data interpretation and analysis. The figure above illustrates representative alignment results for either total</a:t>
+            </a:r>
+            <a:r>
+              <a:rPr lang="en-US" baseline="0" dirty="0" smtClean="0"/>
+              <a:t> </a:t>
+            </a:r>
+            <a:r>
+              <a:rPr lang="en-US" dirty="0" smtClean="0"/>
+              <a:t>RNA or one of three commonly used enrichment strategies at a hypothetical genomic locus with very highly expressed ribosomal RNA (pink), highly</a:t>
+            </a:r>
+            <a:r>
+              <a:rPr lang="en-US" baseline="0" dirty="0" smtClean="0"/>
+              <a:t> </a:t>
+            </a:r>
+            <a:r>
+              <a:rPr lang="en-US" dirty="0" smtClean="0"/>
+              <a:t>expressed protein coding (green), lowly expressed protein coding (brown) and lowly expressed noncoding RNA (blue) genes. (A) If total RNA is sequenced without enrichment, the vast majority of reads correspond to a small number of very highly expressed RNA species such as ribosomal RNAs (rRNAs). In</a:t>
+            </a:r>
+            <a:r>
+              <a:rPr lang="en-US" baseline="0" dirty="0" smtClean="0"/>
+              <a:t> </a:t>
+            </a:r>
+            <a:r>
+              <a:rPr lang="en-US" dirty="0" smtClean="0"/>
+              <a:t>humans, ~95%–98% of all RNA molecules may be rRNAs. A significant amount of genomic DNA (</a:t>
+            </a:r>
+            <a:r>
+              <a:rPr lang="en-US" dirty="0" err="1" smtClean="0"/>
+              <a:t>gDNA</a:t>
+            </a:r>
+            <a:r>
+              <a:rPr lang="en-US" dirty="0" smtClean="0"/>
+              <a:t>) and unprocessed </a:t>
+            </a:r>
+            <a:r>
+              <a:rPr lang="en-US" dirty="0" err="1" smtClean="0"/>
+              <a:t>heteronuclear</a:t>
+            </a:r>
+            <a:r>
+              <a:rPr lang="en-US" dirty="0" smtClean="0"/>
+              <a:t> RNA (</a:t>
+            </a:r>
+            <a:r>
+              <a:rPr lang="en-US" dirty="0" err="1" smtClean="0"/>
+              <a:t>hnRNA</a:t>
+            </a:r>
+            <a:r>
+              <a:rPr lang="en-US" dirty="0" smtClean="0"/>
+              <a:t>, also</a:t>
+            </a:r>
+            <a:r>
+              <a:rPr lang="en-US" baseline="0" dirty="0" smtClean="0"/>
+              <a:t> </a:t>
+            </a:r>
+            <a:r>
+              <a:rPr lang="en-US" dirty="0" smtClean="0"/>
+              <a:t>known as pre-mRNA) contamination may also remain after typical RNA isolation procedures. As a result, most reads will align to intronic, intergenic, and</a:t>
+            </a:r>
+            <a:r>
+              <a:rPr lang="en-US" baseline="0" dirty="0" smtClean="0"/>
+              <a:t> </a:t>
+            </a:r>
+            <a:r>
+              <a:rPr lang="en-US" dirty="0" smtClean="0"/>
+              <a:t>especially to ribosomal gene regions. Since analysis of these molecules is rarely the target of RNA-seq, various enrichment strategies are commonly</a:t>
+            </a:r>
+            <a:r>
+              <a:rPr lang="en-US" baseline="0" dirty="0" smtClean="0"/>
+              <a:t> </a:t>
+            </a:r>
+            <a:r>
+              <a:rPr lang="en-US" dirty="0" smtClean="0"/>
+              <a:t>employed. The amount of </a:t>
+            </a:r>
+            <a:r>
+              <a:rPr lang="en-US" dirty="0" err="1" smtClean="0"/>
+              <a:t>gDNA</a:t>
+            </a:r>
+            <a:r>
+              <a:rPr lang="en-US" dirty="0" smtClean="0"/>
+              <a:t> contamination in total RNA can be reduced, but not entirely eliminated, by use of a </a:t>
+            </a:r>
+            <a:r>
+              <a:rPr lang="en-US" dirty="0" err="1" smtClean="0"/>
+              <a:t>deoxyribonuclease</a:t>
+            </a:r>
+            <a:r>
+              <a:rPr lang="en-US" dirty="0" smtClean="0"/>
+              <a:t> (</a:t>
+            </a:r>
+            <a:r>
+              <a:rPr lang="en-US" dirty="0" err="1" smtClean="0"/>
+              <a:t>DNase</a:t>
+            </a:r>
+            <a:r>
+              <a:rPr lang="en-US" dirty="0" smtClean="0"/>
+              <a:t>) treatment.</a:t>
+            </a:r>
+            <a:r>
+              <a:rPr lang="en-US" baseline="0" dirty="0" smtClean="0"/>
+              <a:t> </a:t>
+            </a:r>
+            <a:r>
+              <a:rPr lang="en-US" dirty="0" smtClean="0"/>
+              <a:t>The amount of unprocessed RNA can be reduced, but not entirely eliminated, by employing an RNA isolation method that attempts to keep nuclei intact and</a:t>
+            </a:r>
+            <a:r>
+              <a:rPr lang="en-US" baseline="0" dirty="0" smtClean="0"/>
+              <a:t> </a:t>
+            </a:r>
+            <a:r>
+              <a:rPr lang="en-US" dirty="0" smtClean="0"/>
+              <a:t>removing these to enrich for mature mRNAs present in the cytoplasmic compartment. Additional strategies are discussed in S3 Table. </a:t>
+            </a:r>
+          </a:p>
+          <a:p>
+            <a:endParaRPr lang="en-US" dirty="0" smtClean="0"/>
+          </a:p>
+          <a:p>
+            <a:r>
+              <a:rPr lang="en-US" dirty="0" smtClean="0"/>
+              <a:t>*</a:t>
+            </a:r>
+            <a:r>
+              <a:rPr lang="en-US" baseline="0" dirty="0" smtClean="0"/>
+              <a:t> </a:t>
+            </a:r>
+            <a:r>
+              <a:rPr lang="en-US" dirty="0" smtClean="0"/>
+              <a:t>When sequencing</a:t>
+            </a:r>
+            <a:r>
+              <a:rPr lang="en-US" baseline="0" dirty="0" smtClean="0"/>
+              <a:t> </a:t>
+            </a:r>
+            <a:r>
+              <a:rPr lang="en-US" dirty="0" smtClean="0"/>
+              <a:t>total RNA, a complete representation of the transcriptome is theoretically present, but in practical terms, insufficient sequence reads are obtained to</a:t>
+            </a:r>
+            <a:r>
+              <a:rPr lang="en-US" baseline="0" dirty="0" smtClean="0"/>
+              <a:t> </a:t>
+            </a:r>
+            <a:r>
+              <a:rPr lang="en-US" dirty="0" smtClean="0"/>
+              <a:t>sufficiently sample all transcripts of all types, and some enrichment strategy is required to reduce extremely abundant rRNA species. (B) Selective rRNA</a:t>
+            </a:r>
+            <a:r>
+              <a:rPr lang="en-US" baseline="0" dirty="0" smtClean="0"/>
+              <a:t> </a:t>
+            </a:r>
+            <a:r>
+              <a:rPr lang="en-US" dirty="0" smtClean="0"/>
+              <a:t>reduction kits use oligonucleotides complementary to ribosomal sequences to specifically reduce the abundance of rRNAs while maintaining a broad</a:t>
+            </a:r>
+            <a:r>
+              <a:rPr lang="en-US" baseline="0" dirty="0" smtClean="0"/>
+              <a:t> </a:t>
+            </a:r>
+            <a:r>
+              <a:rPr lang="en-US" dirty="0" smtClean="0"/>
+              <a:t>representation of transcript species. Since the oligonucleotide probes used in these kits are only designed to bind to and deplete rRNA sequences, a</a:t>
+            </a:r>
+          </a:p>
+          <a:p>
+            <a:r>
+              <a:rPr lang="en-US" dirty="0" smtClean="0"/>
+              <a:t>significant amount of unprocessed RNA and </a:t>
+            </a:r>
+            <a:r>
+              <a:rPr lang="en-US" dirty="0" err="1" smtClean="0"/>
+              <a:t>gDNA</a:t>
+            </a:r>
+            <a:r>
+              <a:rPr lang="en-US" dirty="0" smtClean="0"/>
+              <a:t> contamination may remain. (C) Poly(A) selection and (D) cDNA capture methods specifically enrich for</a:t>
+            </a:r>
+            <a:r>
+              <a:rPr lang="en-US" baseline="0" dirty="0" smtClean="0"/>
+              <a:t> </a:t>
+            </a:r>
+            <a:r>
+              <a:rPr lang="en-US" dirty="0" smtClean="0"/>
+              <a:t>(primarily) mature </a:t>
+            </a:r>
+            <a:r>
+              <a:rPr lang="en-US" dirty="0" err="1" smtClean="0"/>
+              <a:t>polyadenylated</a:t>
+            </a:r>
+            <a:r>
+              <a:rPr lang="en-US" dirty="0" smtClean="0"/>
+              <a:t> RNA species or specific targets (e.g., all known transcript exons), respectively. Since poly(A) selection specifically targets</a:t>
+            </a:r>
+            <a:r>
+              <a:rPr lang="en-US" baseline="0" dirty="0" smtClean="0"/>
+              <a:t> </a:t>
+            </a:r>
+            <a:r>
+              <a:rPr lang="en-US" dirty="0" smtClean="0"/>
+              <a:t>RNAs that have been </a:t>
+            </a:r>
+            <a:r>
+              <a:rPr lang="en-US" dirty="0" err="1" smtClean="0"/>
+              <a:t>polyadenylated</a:t>
+            </a:r>
+            <a:r>
+              <a:rPr lang="en-US" dirty="0" smtClean="0"/>
+              <a:t>—a modification that happens at the end of the transcription process—poly(A) selection results in an enrichment for</a:t>
+            </a:r>
+            <a:r>
+              <a:rPr lang="en-US" baseline="0" dirty="0" smtClean="0"/>
+              <a:t> </a:t>
+            </a:r>
+            <a:r>
+              <a:rPr lang="en-US" dirty="0" smtClean="0"/>
+              <a:t>mature, completely processed RNAs. Poly(A) selection and cDNA capture methods sacrifice some transcriptome representation for increased signal to noise</a:t>
+            </a:r>
+            <a:r>
+              <a:rPr lang="en-US" baseline="0" dirty="0" smtClean="0"/>
+              <a:t> </a:t>
+            </a:r>
+            <a:r>
+              <a:rPr lang="en-US" dirty="0" smtClean="0"/>
+              <a:t>for transcripts of greater interest. Poly(A) methods will fail to represent most noncoding and other </a:t>
+            </a:r>
+            <a:r>
+              <a:rPr lang="en-US" dirty="0" err="1" smtClean="0"/>
+              <a:t>nonpolyadenylated</a:t>
+            </a:r>
+            <a:r>
+              <a:rPr lang="en-US" dirty="0" smtClean="0"/>
+              <a:t> RNAs. Capture methods on the other</a:t>
+            </a:r>
+            <a:r>
+              <a:rPr lang="en-US" baseline="0" dirty="0" smtClean="0"/>
+              <a:t> </a:t>
+            </a:r>
+            <a:r>
+              <a:rPr lang="en-US" dirty="0" smtClean="0"/>
+              <a:t>hand will under-represent any loci not specifically included in the capture design. For example, in this case the brown gene was not included in the design, and</a:t>
+            </a:r>
+            <a:r>
+              <a:rPr lang="en-US" baseline="0" dirty="0" smtClean="0"/>
+              <a:t> </a:t>
+            </a:r>
+            <a:r>
+              <a:rPr lang="en-US" dirty="0" smtClean="0"/>
+              <a:t>therefore, expression of this gene would be underestimated. Each of the methods depicted here has advantages and disadvantages (S3 Table and S7 Table).</a:t>
+            </a:r>
+            <a:r>
+              <a:rPr lang="en-US" baseline="0" dirty="0" smtClean="0"/>
+              <a:t> </a:t>
+            </a:r>
+            <a:r>
+              <a:rPr lang="en-US" dirty="0" smtClean="0"/>
+              <a:t>Furthermore, the relative amounts of each class of RNA depicted in each panel are hypothetical examples meant to demonstrate the goals and principles of</a:t>
+            </a:r>
+            <a:r>
+              <a:rPr lang="en-US" baseline="0" dirty="0" smtClean="0"/>
+              <a:t> </a:t>
+            </a:r>
+            <a:r>
+              <a:rPr lang="en-US" dirty="0" smtClean="0"/>
+              <a:t>each enrichment strategy and should not be interpreted quantitatively. Refer to S4 Table for additional information on the effect of each enrichment strategy.</a:t>
+            </a:r>
+            <a:endParaRPr lang="en-US" dirty="0"/>
+          </a:p>
+        </p:txBody>
+      </p:sp>
+      <p:sp>
+        <p:nvSpPr>
+          <p:cNvPr id="4" name="Slide Number Placeholder 3"/>
+          <p:cNvSpPr>
+            <a:spLocks noGrp="1"/>
+          </p:cNvSpPr>
+          <p:nvPr>
+            <p:ph type="sldNum" sz="quarter" idx="10"/>
+          </p:nvPr>
+        </p:nvSpPr>
+        <p:spPr/>
+        <p:txBody>
+          <a:bodyPr/>
+          <a:lstStyle/>
+          <a:p>
+            <a:pPr>
+              <a:defRPr/>
+            </a:pPr>
+            <a:fld id="{58FBEE90-0CDA-3447-B595-4F8759630F3A}" type="slidenum">
+              <a:rPr lang="en-US" smtClean="0"/>
+              <a:pPr>
+                <a:defRPr/>
+              </a:pPr>
+              <a:t>14</a:t>
+            </a:fld>
+            <a:endParaRPr lang="en-US"/>
           </a:p>
         </p:txBody>
       </p:sp>
     </p:spTree>
+    <p:extLst>
+      <p:ext uri="{BB962C8B-B14F-4D97-AF65-F5344CB8AC3E}">
+        <p14:creationId xmlns:p14="http://schemas.microsoft.com/office/powerpoint/2010/main" val="1805905085"/>
+      </p:ext>
+    </p:extLst>
   </p:cSld>
   <p:clrMapOvr>
     <a:masterClrMapping/>
@@ -3413,236 +4326,294 @@
       </p:grpSpPr>
       <p:sp>
         <p:nvSpPr>
-          <p:cNvPr id="37889" name="Rectangle 7"/>
+          <p:cNvPr id="2" name="Slide Image Placeholder 1"/>
           <p:cNvSpPr>
-            <a:spLocks noGrp="1" noChangeArrowheads="1"/>
-          </p:cNvSpPr>
-          <p:nvPr>
-            <p:ph type="sldNum" sz="quarter" idx="5"/>
-          </p:nvPr>
-        </p:nvSpPr>
-        <p:spPr bwMode="auto">
-          <a:noFill/>
-          <a:extLst>
-            <a:ext uri="{909E8E84-426E-40dd-AFC4-6F175D3DCCD1}">
-              <a14:hiddenFill xmlns:a14="http://schemas.microsoft.com/office/drawing/2010/main">
-                <a:solidFill>
-                  <a:srgbClr val="FFFFFF"/>
-                </a:solidFill>
-              </a14:hiddenFill>
-            </a:ext>
-            <a:ext uri="{91240B29-F687-4f45-9708-019B960494DF}">
-              <a14:hiddenLine xmlns:a14="http://schemas.microsoft.com/office/drawing/2010/main" w="9525">
-                <a:solidFill>
-                  <a:srgbClr val="000000"/>
-                </a:solidFill>
-                <a:miter lim="800000"/>
-                <a:headEnd/>
-                <a:tailEnd/>
-              </a14:hiddenLine>
-            </a:ext>
-          </a:extLst>
-        </p:spPr>
-        <p:txBody>
-          <a:bodyPr/>
-          <a:lstStyle>
-            <a:lvl1pPr eaLnBrk="0" hangingPunct="0">
-              <a:defRPr sz="2400">
-                <a:solidFill>
-                  <a:schemeClr val="tx1"/>
-                </a:solidFill>
-                <a:latin typeface="Arial" charset="0"/>
-                <a:ea typeface="ＭＳ Ｐゴシック" charset="0"/>
-                <a:cs typeface="ＭＳ Ｐゴシック" charset="0"/>
-              </a:defRPr>
-            </a:lvl1pPr>
-            <a:lvl2pPr marL="742950" indent="-285750" eaLnBrk="0" hangingPunct="0">
-              <a:defRPr sz="2400">
-                <a:solidFill>
-                  <a:schemeClr val="tx1"/>
-                </a:solidFill>
-                <a:latin typeface="Arial" charset="0"/>
-                <a:ea typeface="ＭＳ Ｐゴシック" charset="0"/>
-              </a:defRPr>
-            </a:lvl2pPr>
-            <a:lvl3pPr marL="1143000" indent="-228600" eaLnBrk="0" hangingPunct="0">
-              <a:defRPr sz="2400">
-                <a:solidFill>
-                  <a:schemeClr val="tx1"/>
-                </a:solidFill>
-                <a:latin typeface="Arial" charset="0"/>
-                <a:ea typeface="ＭＳ Ｐゴシック" charset="0"/>
-              </a:defRPr>
-            </a:lvl3pPr>
-            <a:lvl4pPr marL="1600200" indent="-228600" eaLnBrk="0" hangingPunct="0">
-              <a:defRPr sz="2400">
-                <a:solidFill>
-                  <a:schemeClr val="tx1"/>
-                </a:solidFill>
-                <a:latin typeface="Arial" charset="0"/>
-                <a:ea typeface="ＭＳ Ｐゴシック" charset="0"/>
-              </a:defRPr>
-            </a:lvl4pPr>
-            <a:lvl5pPr marL="2057400" indent="-228600" eaLnBrk="0" hangingPunct="0">
-              <a:defRPr sz="2400">
-                <a:solidFill>
-                  <a:schemeClr val="tx1"/>
-                </a:solidFill>
-                <a:latin typeface="Arial" charset="0"/>
-                <a:ea typeface="ＭＳ Ｐゴシック" charset="0"/>
-              </a:defRPr>
-            </a:lvl5pPr>
-            <a:lvl6pPr marL="2514600" indent="-228600" eaLnBrk="0" fontAlgn="base" hangingPunct="0">
-              <a:spcBef>
-                <a:spcPct val="0"/>
-              </a:spcBef>
-              <a:spcAft>
-                <a:spcPct val="0"/>
-              </a:spcAft>
-              <a:defRPr sz="2400">
-                <a:solidFill>
-                  <a:schemeClr val="tx1"/>
-                </a:solidFill>
-                <a:latin typeface="Arial" charset="0"/>
-                <a:ea typeface="ＭＳ Ｐゴシック" charset="0"/>
-              </a:defRPr>
-            </a:lvl6pPr>
-            <a:lvl7pPr marL="2971800" indent="-228600" eaLnBrk="0" fontAlgn="base" hangingPunct="0">
-              <a:spcBef>
-                <a:spcPct val="0"/>
-              </a:spcBef>
-              <a:spcAft>
-                <a:spcPct val="0"/>
-              </a:spcAft>
-              <a:defRPr sz="2400">
-                <a:solidFill>
-                  <a:schemeClr val="tx1"/>
-                </a:solidFill>
-                <a:latin typeface="Arial" charset="0"/>
-                <a:ea typeface="ＭＳ Ｐゴシック" charset="0"/>
-              </a:defRPr>
-            </a:lvl7pPr>
-            <a:lvl8pPr marL="3429000" indent="-228600" eaLnBrk="0" fontAlgn="base" hangingPunct="0">
-              <a:spcBef>
-                <a:spcPct val="0"/>
-              </a:spcBef>
-              <a:spcAft>
-                <a:spcPct val="0"/>
-              </a:spcAft>
-              <a:defRPr sz="2400">
-                <a:solidFill>
-                  <a:schemeClr val="tx1"/>
-                </a:solidFill>
-                <a:latin typeface="Arial" charset="0"/>
-                <a:ea typeface="ＭＳ Ｐゴシック" charset="0"/>
-              </a:defRPr>
-            </a:lvl8pPr>
-            <a:lvl9pPr marL="3886200" indent="-228600" eaLnBrk="0" fontAlgn="base" hangingPunct="0">
-              <a:spcBef>
-                <a:spcPct val="0"/>
-              </a:spcBef>
-              <a:spcAft>
-                <a:spcPct val="0"/>
-              </a:spcAft>
-              <a:defRPr sz="2400">
-                <a:solidFill>
-                  <a:schemeClr val="tx1"/>
-                </a:solidFill>
-                <a:latin typeface="Arial" charset="0"/>
-                <a:ea typeface="ＭＳ Ｐゴシック" charset="0"/>
-              </a:defRPr>
-            </a:lvl9pPr>
-          </a:lstStyle>
-          <a:p>
-            <a:pPr eaLnBrk="1" hangingPunct="1"/>
-            <a:fld id="{876BF016-1E7C-3C4A-993E-737B795E1553}" type="slidenum">
-              <a:rPr lang="en-US" sz="1300">
-                <a:latin typeface="Calibri" charset="0"/>
-              </a:rPr>
-              <a:pPr eaLnBrk="1" hangingPunct="1"/>
-              <a:t>20</a:t>
-            </a:fld>
-            <a:endParaRPr lang="en-US" sz="1300">
-              <a:latin typeface="Calibri" charset="0"/>
-            </a:endParaRPr>
-          </a:p>
-        </p:txBody>
-      </p:sp>
-      <p:sp>
-        <p:nvSpPr>
-          <p:cNvPr id="37890" name="Rectangle 2"/>
-          <p:cNvSpPr>
-            <a:spLocks noGrp="1" noRot="1" noChangeAspect="1" noChangeArrowheads="1" noTextEdit="1"/>
+            <a:spLocks noGrp="1" noRot="1" noChangeAspect="1"/>
           </p:cNvSpPr>
           <p:nvPr>
             <p:ph type="sldImg"/>
           </p:nvPr>
         </p:nvSpPr>
-        <p:spPr bwMode="auto">
-          <a:solidFill>
-            <a:srgbClr val="FFFFFF"/>
-          </a:solidFill>
-          <a:ln>
-            <a:solidFill>
-              <a:srgbClr val="000000"/>
-            </a:solidFill>
-            <a:miter lim="800000"/>
-            <a:headEnd/>
-            <a:tailEnd/>
-          </a:ln>
-          <a:extLst>
-            <a:ext uri="{FAA26D3D-D897-4be2-8F04-BA451C77F1D7}">
-              <ma14:placeholderFlag xmlns:ma14="http://schemas.microsoft.com/office/mac/drawingml/2011/main" val="1"/>
-            </a:ext>
-          </a:extLst>
-        </p:spPr>
+        <p:spPr/>
       </p:sp>
       <p:sp>
         <p:nvSpPr>
-          <p:cNvPr id="37891" name="Rectangle 3"/>
+          <p:cNvPr id="3" name="Notes Placeholder 2"/>
           <p:cNvSpPr>
-            <a:spLocks noGrp="1" noChangeArrowheads="1"/>
+            <a:spLocks noGrp="1"/>
           </p:cNvSpPr>
           <p:nvPr>
             <p:ph type="body" idx="1"/>
           </p:nvPr>
         </p:nvSpPr>
-        <p:spPr bwMode="auto">
-          <a:solidFill>
-            <a:srgbClr val="FFFFFF"/>
-          </a:solidFill>
-          <a:ln>
-            <a:solidFill>
-              <a:srgbClr val="000000"/>
-            </a:solidFill>
-            <a:miter lim="800000"/>
-            <a:headEnd/>
-            <a:tailEnd/>
-          </a:ln>
-          <a:extLst>
-            <a:ext uri="{FAA26D3D-D897-4be2-8F04-BA451C77F1D7}">
-              <ma14:placeholderFlag xmlns:ma14="http://schemas.microsoft.com/office/mac/drawingml/2011/main" val="1"/>
-            </a:ext>
-          </a:extLst>
-        </p:spPr>
+        <p:spPr/>
         <p:txBody>
-          <a:bodyPr wrap="square" numCol="1" anchor="t" anchorCtr="0" compatLnSpc="1">
-            <a:prstTxWarp prst="textNoShape">
-              <a:avLst/>
-            </a:prstTxWarp>
+          <a:bodyPr>
+            <a:normAutofit fontScale="55000" lnSpcReduction="20000"/>
           </a:bodyPr>
           <a:lstStyle/>
           <a:p>
-            <a:pPr eaLnBrk="1" hangingPunct="1"/>
-            <a:endParaRPr lang="en-US">
-              <a:latin typeface="Calibri" charset="0"/>
-              <a:ea typeface="ＭＳ Ｐゴシック" charset="0"/>
-              <a:cs typeface="ＭＳ Ｐゴシック" charset="0"/>
-            </a:endParaRPr>
+            <a:r>
+              <a:rPr lang="en-US" dirty="0" smtClean="0"/>
+              <a:t>Comparison of stranded and </a:t>
+            </a:r>
+            <a:r>
+              <a:rPr lang="en-US" dirty="0" err="1" smtClean="0"/>
+              <a:t>unstranded</a:t>
+            </a:r>
+            <a:r>
+              <a:rPr lang="en-US" dirty="0" smtClean="0"/>
+              <a:t> RNA-seq library methods and their influence on interpretation and analysis. (A) Many RNA-seq</a:t>
+            </a:r>
+            <a:r>
+              <a:rPr lang="en-US" baseline="0" dirty="0" smtClean="0"/>
+              <a:t> </a:t>
+            </a:r>
+            <a:r>
+              <a:rPr lang="en-US" dirty="0" smtClean="0"/>
+              <a:t>library construction protocols do not maintain the strand identity of RNA transcripts in the sequence data (S1 Table). In these “</a:t>
+            </a:r>
+            <a:r>
+              <a:rPr lang="en-US" dirty="0" err="1" smtClean="0"/>
+              <a:t>unstranded</a:t>
+            </a:r>
+            <a:r>
+              <a:rPr lang="en-US" dirty="0" smtClean="0"/>
+              <a:t>” strategies, </a:t>
+            </a:r>
+            <a:r>
+              <a:rPr lang="en-US" dirty="0" err="1" smtClean="0"/>
+              <a:t>doublestranded</a:t>
+            </a:r>
+            <a:r>
+              <a:rPr lang="en-US" baseline="0" dirty="0" smtClean="0"/>
+              <a:t> </a:t>
+            </a:r>
+            <a:r>
+              <a:rPr lang="en-US" dirty="0" smtClean="0"/>
+              <a:t>cDNA is sequenced, and knowledge of the transcription strand of the RNA molecule is lost. This results in an even mix of reads from both strands.</a:t>
+            </a:r>
+            <a:r>
+              <a:rPr lang="en-US" baseline="0" dirty="0" smtClean="0"/>
+              <a:t> </a:t>
+            </a:r>
+            <a:r>
+              <a:rPr lang="en-US" dirty="0" smtClean="0"/>
+              <a:t>In panel A, a gene transcribed on the positive strand is shown in green, a second gene transcribed on the negative strand is shown in brown, and a third gene</a:t>
+            </a:r>
+          </a:p>
+          <a:p>
+            <a:r>
+              <a:rPr lang="en-US" dirty="0" smtClean="0"/>
+              <a:t>transcribed on the positive strand (partially overlapping the second gene) is shown in yellow. The first two genes are protein coding with the open reading frame (ORF) portion depicted as thick rectangles and the UTRs depicted as thin rectangles. The third gene is a noncoding RNA gene. Aligned paired-end</a:t>
+            </a:r>
+            <a:r>
+              <a:rPr lang="en-US" baseline="0" dirty="0" smtClean="0"/>
+              <a:t> </a:t>
+            </a:r>
+            <a:r>
+              <a:rPr lang="en-US" dirty="0" smtClean="0"/>
+              <a:t>read sequences (read 1 and read 2) are depicted as short colored bars connected by thin lines. The thin connecting line in each read pair depicts the portion</a:t>
+            </a:r>
+            <a:r>
+              <a:rPr lang="en-US" baseline="0" dirty="0" smtClean="0"/>
+              <a:t> </a:t>
+            </a:r>
+            <a:r>
+              <a:rPr lang="en-US" dirty="0" smtClean="0"/>
+              <a:t>of the cDNA fragment that remains </a:t>
+            </a:r>
+            <a:r>
+              <a:rPr lang="en-US" dirty="0" err="1" smtClean="0"/>
+              <a:t>unsequenced</a:t>
+            </a:r>
+            <a:r>
+              <a:rPr lang="en-US" dirty="0" smtClean="0"/>
+              <a:t> when the cDNA fragment is larger than two times the read length. Each read is colored according to the</a:t>
+            </a:r>
+            <a:r>
+              <a:rPr lang="en-US" baseline="0" dirty="0" smtClean="0"/>
+              <a:t> </a:t>
+            </a:r>
+            <a:r>
+              <a:rPr lang="en-US" dirty="0" smtClean="0"/>
+              <a:t>strand sequenced, blue for the positive (forward/sense) strand and red for the negative (reverse/antisense) strand. Using known annotations, the mapped</a:t>
+            </a:r>
+            <a:r>
+              <a:rPr lang="en-US" baseline="0" dirty="0" smtClean="0"/>
+              <a:t> </a:t>
+            </a:r>
+            <a:r>
+              <a:rPr lang="en-US" dirty="0" smtClean="0"/>
+              <a:t>position of each read, and knowledge of exon splicing patterns, the likely transcription strand of some reads can be inferred. However, for many aligned reads</a:t>
+            </a:r>
+            <a:r>
+              <a:rPr lang="en-US" baseline="0" dirty="0" smtClean="0"/>
+              <a:t> </a:t>
+            </a:r>
+            <a:r>
+              <a:rPr lang="en-US" dirty="0" smtClean="0"/>
+              <a:t>the transcription strand cannot be inferred and sense-antisense expression analysis is not possible. Note that for each gene, an approximately equal</a:t>
+            </a:r>
+            <a:r>
+              <a:rPr lang="en-US" baseline="0" dirty="0" smtClean="0"/>
+              <a:t> </a:t>
+            </a:r>
+            <a:r>
+              <a:rPr lang="en-US" dirty="0" smtClean="0"/>
+              <a:t>proportion of reads corresponding to each strand are observed. Also note that read pairing information can sometimes be used to infer which gene a read</a:t>
+            </a:r>
+            <a:r>
+              <a:rPr lang="en-US" baseline="0" dirty="0" smtClean="0"/>
+              <a:t> </a:t>
+            </a:r>
+            <a:r>
+              <a:rPr lang="en-US" dirty="0" smtClean="0"/>
+              <a:t>was likely derived from. These reads are referred to as “encompassing” read pairs, in which one read of a pair aligns within one exon and the second read of</a:t>
+            </a:r>
+            <a:r>
+              <a:rPr lang="en-US" baseline="0" dirty="0" smtClean="0"/>
+              <a:t> </a:t>
+            </a:r>
+            <a:r>
+              <a:rPr lang="en-US" dirty="0" smtClean="0"/>
+              <a:t>a pair aligns within another exon. However, reads that align within a region corresponding to overlapping genes cannot be unambiguously assigned to either</a:t>
+            </a:r>
+            <a:r>
+              <a:rPr lang="en-US" baseline="0" dirty="0" smtClean="0"/>
+              <a:t> </a:t>
+            </a:r>
+            <a:r>
+              <a:rPr lang="en-US" dirty="0" smtClean="0"/>
+              <a:t>gene (e.g., the portion of the brown and yellow genes that overlap). Note that in this figure we are not depicting any reads in which a single read of a read pair</a:t>
+            </a:r>
+            <a:r>
+              <a:rPr lang="en-US" baseline="0" dirty="0" smtClean="0"/>
+              <a:t> </a:t>
+            </a:r>
+            <a:r>
+              <a:rPr lang="en-US" dirty="0" smtClean="0"/>
+              <a:t>spans across an intron. These exon–exon “spanning” reads can usually be matched unambiguously to a transcript, even in an </a:t>
+            </a:r>
+            <a:r>
+              <a:rPr lang="en-US" dirty="0" err="1" smtClean="0"/>
+              <a:t>unstranded</a:t>
+            </a:r>
+            <a:r>
+              <a:rPr lang="en-US" dirty="0" smtClean="0"/>
+              <a:t> library, because</a:t>
+            </a:r>
+            <a:r>
+              <a:rPr lang="en-US" baseline="0" dirty="0" smtClean="0"/>
+              <a:t> </a:t>
+            </a:r>
+            <a:r>
+              <a:rPr lang="en-US" dirty="0" smtClean="0"/>
+              <a:t>the exon–exon junction alignments line up with known splice sites and exon boundaries. (B) More recent “stranded” RNA-seq library strategies allow the</a:t>
+            </a:r>
+            <a:r>
+              <a:rPr lang="en-US" baseline="0" dirty="0" smtClean="0"/>
+              <a:t> </a:t>
+            </a:r>
+            <a:r>
+              <a:rPr lang="en-US" dirty="0" smtClean="0"/>
+              <a:t>strand information to be retained. In the resulting alignments, depicted in panel B, the strand of the alignment corresponds in a predictable way to the</a:t>
+            </a:r>
+            <a:r>
+              <a:rPr lang="en-US" baseline="0" dirty="0" smtClean="0"/>
+              <a:t> </a:t>
+            </a:r>
+            <a:r>
+              <a:rPr lang="en-US" dirty="0" smtClean="0"/>
+              <a:t>transcription strand of the sequenced RNA molecule. Now we see that reads aligning within a gene are indicated as being derived from the expected</a:t>
+            </a:r>
+            <a:r>
+              <a:rPr lang="en-US" baseline="0" dirty="0" smtClean="0"/>
+              <a:t> </a:t>
+            </a:r>
+            <a:r>
+              <a:rPr lang="en-US" dirty="0" smtClean="0"/>
+              <a:t>transcription strand for that gene. Furthermore, in regions where two genes overlap on opposite strands, we can now unambiguously assign reads to each</a:t>
+            </a:r>
+            <a:r>
+              <a:rPr lang="en-US" baseline="0" dirty="0" smtClean="0"/>
+              <a:t> </a:t>
+            </a:r>
+            <a:r>
+              <a:rPr lang="en-US" dirty="0" smtClean="0"/>
+              <a:t>gene. (C) When strand</a:t>
+            </a:r>
+            <a:r>
+              <a:rPr lang="en-US" baseline="0" dirty="0" smtClean="0"/>
+              <a:t> </a:t>
+            </a:r>
+            <a:r>
+              <a:rPr lang="en-US" dirty="0" smtClean="0"/>
+              <a:t>information is maintained by the RNA-seq protocol, it can be visualized in genome browsers such as IGV [62]. For example, to make</a:t>
+            </a:r>
+            <a:r>
+              <a:rPr lang="en-US" baseline="0" dirty="0" smtClean="0"/>
+              <a:t> </a:t>
+            </a:r>
+            <a:r>
+              <a:rPr lang="en-US" dirty="0" smtClean="0"/>
+              <a:t>IGV color read alignments according to strand, use the “Color alignments” by “First-of-pair strand” setting (refer to S5 Table for more strand-</a:t>
+            </a:r>
+            <a:r>
+              <a:rPr lang="en-US" smtClean="0"/>
+              <a:t>related software</a:t>
+            </a:r>
+            <a:r>
+              <a:rPr lang="en-US" baseline="0" smtClean="0"/>
+              <a:t> </a:t>
+            </a:r>
+            <a:r>
+              <a:rPr lang="en-US" smtClean="0"/>
+              <a:t>settings</a:t>
+            </a:r>
+            <a:r>
+              <a:rPr lang="en-US" dirty="0" smtClean="0"/>
+              <a:t>).</a:t>
+            </a:r>
+            <a:endParaRPr lang="en-US" dirty="0"/>
+          </a:p>
+        </p:txBody>
+      </p:sp>
+      <p:sp>
+        <p:nvSpPr>
+          <p:cNvPr id="4" name="Slide Number Placeholder 3"/>
+          <p:cNvSpPr>
+            <a:spLocks noGrp="1"/>
+          </p:cNvSpPr>
+          <p:nvPr>
+            <p:ph type="sldNum" sz="quarter" idx="10"/>
+          </p:nvPr>
+        </p:nvSpPr>
+        <p:spPr/>
+        <p:txBody>
+          <a:bodyPr/>
+          <a:lstStyle/>
+          <a:p>
+            <a:pPr>
+              <a:defRPr/>
+            </a:pPr>
+            <a:fld id="{58FBEE90-0CDA-3447-B595-4F8759630F3A}" type="slidenum">
+              <a:rPr lang="en-US" smtClean="0"/>
+              <a:pPr>
+                <a:defRPr/>
+              </a:pPr>
+              <a:t>15</a:t>
+            </a:fld>
+            <a:endParaRPr lang="en-US"/>
           </a:p>
         </p:txBody>
       </p:sp>
     </p:spTree>
+    <p:extLst>
+      <p:ext uri="{BB962C8B-B14F-4D97-AF65-F5344CB8AC3E}">
+        <p14:creationId xmlns:p14="http://schemas.microsoft.com/office/powerpoint/2010/main" val="4228216750"/>
+      </p:ext>
+    </p:extLst>
   </p:cSld>
   <p:clrMapOvr>
     <a:masterClrMapping/>
@@ -7764,7 +8735,7 @@
           <p:nvPr/>
         </p:nvPicPr>
         <p:blipFill>
-          <a:blip r:embed="rId2" cstate="print">
+          <a:blip r:embed="rId3" cstate="print">
             <a:extLst>
               <a:ext uri="{28A0092B-C50C-407E-A947-70E740481C1C}">
                 <a14:useLocalDpi xmlns:a14="http://schemas.microsoft.com/office/drawing/2010/main" val="0"/>
@@ -7865,7 +8836,7 @@
           <p:nvPr/>
         </p:nvPicPr>
         <p:blipFill>
-          <a:blip r:embed="rId2" cstate="print">
+          <a:blip r:embed="rId3" cstate="print">
             <a:extLst>
               <a:ext uri="{28A0092B-C50C-407E-A947-70E740481C1C}">
                 <a14:useLocalDpi xmlns:a14="http://schemas.microsoft.com/office/drawing/2010/main" val="0"/>
@@ -8007,7 +8978,7 @@
           <p:nvPr/>
         </p:nvPicPr>
         <p:blipFill rotWithShape="1">
-          <a:blip r:embed="rId2" cstate="print">
+          <a:blip r:embed="rId3" cstate="print">
             <a:extLst>
               <a:ext uri="{28A0092B-C50C-407E-A947-70E740481C1C}">
                 <a14:useLocalDpi xmlns:a14="http://schemas.microsoft.com/office/drawing/2010/main" val="0"/>
@@ -8036,7 +9007,7 @@
           <p:nvPr/>
         </p:nvPicPr>
         <p:blipFill rotWithShape="1">
-          <a:blip r:embed="rId2" cstate="print">
+          <a:blip r:embed="rId3" cstate="print">
             <a:extLst>
               <a:ext uri="{28A0092B-C50C-407E-A947-70E740481C1C}">
                 <a14:useLocalDpi xmlns:a14="http://schemas.microsoft.com/office/drawing/2010/main" val="0"/>
@@ -11031,11 +12002,7 @@
             </a:pPr>
             <a:r>
               <a:rPr lang="en-US" b="1" dirty="0" smtClean="0"/>
-              <a:t>Module </a:t>
-            </a:r>
-            <a:r>
-              <a:rPr lang="en-US" b="1" dirty="0" smtClean="0"/>
-              <a:t>1: </a:t>
+              <a:t>Module 1: </a:t>
             </a:r>
             <a:r>
               <a:rPr lang="en-US" b="1" dirty="0"/>

</xml_diff>